<commit_message>
Presentation draft (common parts)
</commit_message>
<xml_diff>
--- a/presentation.pptx
+++ b/presentation.pptx
@@ -7,25 +7,35 @@
     <p:sldMasterId id="2147483663" r:id="rId3"/>
   </p:sldMasterIdLst>
   <p:notesMasterIdLst>
-    <p:notesMasterId r:id="rId17"/>
+    <p:notesMasterId r:id="rId27"/>
   </p:notesMasterIdLst>
   <p:handoutMasterIdLst>
-    <p:handoutMasterId r:id="rId18"/>
+    <p:handoutMasterId r:id="rId28"/>
   </p:handoutMasterIdLst>
   <p:sldIdLst>
     <p:sldId id="270" r:id="rId4"/>
     <p:sldId id="257" r:id="rId5"/>
-    <p:sldId id="258" r:id="rId6"/>
-    <p:sldId id="260" r:id="rId7"/>
-    <p:sldId id="261" r:id="rId8"/>
-    <p:sldId id="262" r:id="rId9"/>
-    <p:sldId id="263" r:id="rId10"/>
-    <p:sldId id="264" r:id="rId11"/>
-    <p:sldId id="265" r:id="rId12"/>
-    <p:sldId id="266" r:id="rId13"/>
-    <p:sldId id="267" r:id="rId14"/>
-    <p:sldId id="268" r:id="rId15"/>
-    <p:sldId id="269" r:id="rId16"/>
+    <p:sldId id="271" r:id="rId6"/>
+    <p:sldId id="272" r:id="rId7"/>
+    <p:sldId id="273" r:id="rId8"/>
+    <p:sldId id="274" r:id="rId9"/>
+    <p:sldId id="275" r:id="rId10"/>
+    <p:sldId id="276" r:id="rId11"/>
+    <p:sldId id="277" r:id="rId12"/>
+    <p:sldId id="278" r:id="rId13"/>
+    <p:sldId id="279" r:id="rId14"/>
+    <p:sldId id="280" r:id="rId15"/>
+    <p:sldId id="281" r:id="rId16"/>
+    <p:sldId id="284" r:id="rId17"/>
+    <p:sldId id="282" r:id="rId18"/>
+    <p:sldId id="283" r:id="rId19"/>
+    <p:sldId id="285" r:id="rId20"/>
+    <p:sldId id="286" r:id="rId21"/>
+    <p:sldId id="287" r:id="rId22"/>
+    <p:sldId id="288" r:id="rId23"/>
+    <p:sldId id="268" r:id="rId24"/>
+    <p:sldId id="290" r:id="rId25"/>
+    <p:sldId id="289" r:id="rId26"/>
   </p:sldIdLst>
   <p:sldSz cx="9144000" cy="5143500" type="screen16x9"/>
   <p:notesSz cx="6858000" cy="9144000"/>
@@ -228,7 +238,7 @@
           <a:p>
             <a:fld id="{3FDC14FC-A894-4869-A797-1EC82735D106}" type="datetimeFigureOut">
               <a:rPr lang="en-US" smtClean="0"/>
-              <a:t>10/3/2019</a:t>
+              <a:t>10/12/2019</a:t>
             </a:fld>
             <a:endParaRPr lang="en-US"/>
           </a:p>
@@ -393,7 +403,7 @@
           <a:p>
             <a:fld id="{B4F99C05-63F9-4248-8E20-3ACD9DF9DE7F}" type="datetimeFigureOut">
               <a:rPr lang="en-US" smtClean="0"/>
-              <a:t>10/3/2019</a:t>
+              <a:t>10/12/2019</a:t>
             </a:fld>
             <a:endParaRPr lang="en-US"/>
           </a:p>
@@ -660,6 +670,467 @@
 </p:notesMaster>
 </file>
 
+<file path=ppt/notesSlides/notesSlide1.xml><?xml version="1.0" encoding="utf-8"?>
+<p:notes xmlns:a="http://schemas.openxmlformats.org/drawingml/2006/main" xmlns:r="http://schemas.openxmlformats.org/officeDocument/2006/relationships" xmlns:p="http://schemas.openxmlformats.org/presentationml/2006/main">
+  <p:cSld>
+    <p:spTree>
+      <p:nvGrpSpPr>
+        <p:cNvPr id="1" name=""/>
+        <p:cNvGrpSpPr/>
+        <p:nvPr/>
+      </p:nvGrpSpPr>
+      <p:grpSpPr>
+        <a:xfrm>
+          <a:off x="0" y="0"/>
+          <a:ext cx="0" cy="0"/>
+          <a:chOff x="0" y="0"/>
+          <a:chExt cx="0" cy="0"/>
+        </a:xfrm>
+      </p:grpSpPr>
+      <p:sp>
+        <p:nvSpPr>
+          <p:cNvPr id="2" name="Образ слайда 1"/>
+          <p:cNvSpPr>
+            <a:spLocks noGrp="1" noRot="1" noChangeAspect="1"/>
+          </p:cNvSpPr>
+          <p:nvPr>
+            <p:ph type="sldImg"/>
+          </p:nvPr>
+        </p:nvSpPr>
+        <p:spPr/>
+      </p:sp>
+      <p:sp>
+        <p:nvSpPr>
+          <p:cNvPr id="3" name="Заметки 2"/>
+          <p:cNvSpPr>
+            <a:spLocks noGrp="1"/>
+          </p:cNvSpPr>
+          <p:nvPr>
+            <p:ph type="body" idx="1"/>
+          </p:nvPr>
+        </p:nvSpPr>
+        <p:spPr/>
+        <p:txBody>
+          <a:bodyPr/>
+          <a:lstStyle/>
+          <a:p>
+            <a:pPr marL="228600" indent="-228600">
+              <a:buAutoNum type="arabicPeriod"/>
+            </a:pPr>
+            <a:r>
+              <a:rPr lang="en-US" baseline="0" dirty="0" smtClean="0"/>
+              <a:t>Wrapper (binding) to cross platform lib (GTK+, </a:t>
+            </a:r>
+            <a:r>
+              <a:rPr lang="en-US" baseline="0" dirty="0" err="1" smtClean="0"/>
+              <a:t>Qt</a:t>
+            </a:r>
+            <a:r>
+              <a:rPr lang="en-US" baseline="0" dirty="0" smtClean="0"/>
+              <a:t>, …)</a:t>
+            </a:r>
+          </a:p>
+          <a:p>
+            <a:pPr marL="228600" indent="-228600">
+              <a:buAutoNum type="arabicPeriod"/>
+            </a:pPr>
+            <a:r>
+              <a:rPr lang="en-US" dirty="0" smtClean="0"/>
+              <a:t>Native</a:t>
+            </a:r>
+            <a:r>
+              <a:rPr lang="en-US" baseline="0" dirty="0" smtClean="0"/>
+              <a:t> </a:t>
+            </a:r>
+            <a:r>
+              <a:rPr lang="en-US" baseline="0" dirty="0" err="1" smtClean="0"/>
+              <a:t>.Net</a:t>
+            </a:r>
+            <a:r>
+              <a:rPr lang="en-US" baseline="0" dirty="0" smtClean="0"/>
+              <a:t> lib (Avalonia, </a:t>
+            </a:r>
+            <a:r>
+              <a:rPr lang="en-US" baseline="0" dirty="0" err="1" smtClean="0"/>
+              <a:t>Eto.Forms</a:t>
+            </a:r>
+            <a:r>
+              <a:rPr lang="en-US" baseline="0" dirty="0" smtClean="0"/>
+              <a:t>, …)</a:t>
+            </a:r>
+          </a:p>
+          <a:p>
+            <a:pPr marL="228600" indent="-228600">
+              <a:buAutoNum type="arabicPeriod"/>
+            </a:pPr>
+            <a:r>
+              <a:rPr lang="en-US" baseline="0" dirty="0" smtClean="0"/>
+              <a:t>HTML/CSS-based render (CEF, Electron, </a:t>
+            </a:r>
+            <a:r>
+              <a:rPr lang="en-US" baseline="0" dirty="0" err="1" smtClean="0"/>
+              <a:t>Sciter</a:t>
+            </a:r>
+            <a:r>
+              <a:rPr lang="en-US" baseline="0" dirty="0" smtClean="0"/>
+              <a:t>, …) </a:t>
+            </a:r>
+            <a:endParaRPr lang="ru-RU" dirty="0"/>
+          </a:p>
+        </p:txBody>
+      </p:sp>
+      <p:sp>
+        <p:nvSpPr>
+          <p:cNvPr id="4" name="Номер слайда 3"/>
+          <p:cNvSpPr>
+            <a:spLocks noGrp="1"/>
+          </p:cNvSpPr>
+          <p:nvPr>
+            <p:ph type="sldNum" sz="quarter" idx="10"/>
+          </p:nvPr>
+        </p:nvSpPr>
+        <p:spPr/>
+        <p:txBody>
+          <a:bodyPr/>
+          <a:lstStyle/>
+          <a:p>
+            <a:fld id="{A874FABB-6DBE-47C4-B626-20167906F475}" type="slidenum">
+              <a:rPr lang="en-US" smtClean="0"/>
+              <a:t>4</a:t>
+            </a:fld>
+            <a:endParaRPr lang="en-US"/>
+          </a:p>
+        </p:txBody>
+      </p:sp>
+    </p:spTree>
+    <p:extLst>
+      <p:ext uri="{BB962C8B-B14F-4D97-AF65-F5344CB8AC3E}">
+        <p14:creationId xmlns:p14="http://schemas.microsoft.com/office/powerpoint/2010/main" val="2851591837"/>
+      </p:ext>
+    </p:extLst>
+  </p:cSld>
+  <p:clrMapOvr>
+    <a:masterClrMapping/>
+  </p:clrMapOvr>
+</p:notes>
+</file>
+
+<file path=ppt/notesSlides/notesSlide2.xml><?xml version="1.0" encoding="utf-8"?>
+<p:notes xmlns:a="http://schemas.openxmlformats.org/drawingml/2006/main" xmlns:r="http://schemas.openxmlformats.org/officeDocument/2006/relationships" xmlns:p="http://schemas.openxmlformats.org/presentationml/2006/main">
+  <p:cSld>
+    <p:spTree>
+      <p:nvGrpSpPr>
+        <p:cNvPr id="1" name=""/>
+        <p:cNvGrpSpPr/>
+        <p:nvPr/>
+      </p:nvGrpSpPr>
+      <p:grpSpPr>
+        <a:xfrm>
+          <a:off x="0" y="0"/>
+          <a:ext cx="0" cy="0"/>
+          <a:chOff x="0" y="0"/>
+          <a:chExt cx="0" cy="0"/>
+        </a:xfrm>
+      </p:grpSpPr>
+      <p:sp>
+        <p:nvSpPr>
+          <p:cNvPr id="2" name="Образ слайда 1"/>
+          <p:cNvSpPr>
+            <a:spLocks noGrp="1" noRot="1" noChangeAspect="1"/>
+          </p:cNvSpPr>
+          <p:nvPr>
+            <p:ph type="sldImg"/>
+          </p:nvPr>
+        </p:nvSpPr>
+        <p:spPr/>
+      </p:sp>
+      <p:sp>
+        <p:nvSpPr>
+          <p:cNvPr id="3" name="Заметки 2"/>
+          <p:cNvSpPr>
+            <a:spLocks noGrp="1"/>
+          </p:cNvSpPr>
+          <p:nvPr>
+            <p:ph type="body" idx="1"/>
+          </p:nvPr>
+        </p:nvSpPr>
+        <p:spPr/>
+        <p:txBody>
+          <a:bodyPr/>
+          <a:lstStyle/>
+          <a:p>
+            <a:endParaRPr lang="ru-RU" dirty="0"/>
+          </a:p>
+        </p:txBody>
+      </p:sp>
+      <p:sp>
+        <p:nvSpPr>
+          <p:cNvPr id="4" name="Номер слайда 3"/>
+          <p:cNvSpPr>
+            <a:spLocks noGrp="1"/>
+          </p:cNvSpPr>
+          <p:nvPr>
+            <p:ph type="sldNum" sz="quarter" idx="10"/>
+          </p:nvPr>
+        </p:nvSpPr>
+        <p:spPr/>
+        <p:txBody>
+          <a:bodyPr/>
+          <a:lstStyle/>
+          <a:p>
+            <a:fld id="{A874FABB-6DBE-47C4-B626-20167906F475}" type="slidenum">
+              <a:rPr lang="en-US" smtClean="0"/>
+              <a:t>5</a:t>
+            </a:fld>
+            <a:endParaRPr lang="en-US"/>
+          </a:p>
+        </p:txBody>
+      </p:sp>
+    </p:spTree>
+    <p:extLst>
+      <p:ext uri="{BB962C8B-B14F-4D97-AF65-F5344CB8AC3E}">
+        <p14:creationId xmlns:p14="http://schemas.microsoft.com/office/powerpoint/2010/main" val="709578995"/>
+      </p:ext>
+    </p:extLst>
+  </p:cSld>
+  <p:clrMapOvr>
+    <a:masterClrMapping/>
+  </p:clrMapOvr>
+</p:notes>
+</file>
+
+<file path=ppt/notesSlides/notesSlide3.xml><?xml version="1.0" encoding="utf-8"?>
+<p:notes xmlns:a="http://schemas.openxmlformats.org/drawingml/2006/main" xmlns:r="http://schemas.openxmlformats.org/officeDocument/2006/relationships" xmlns:p="http://schemas.openxmlformats.org/presentationml/2006/main">
+  <p:cSld>
+    <p:spTree>
+      <p:nvGrpSpPr>
+        <p:cNvPr id="1" name=""/>
+        <p:cNvGrpSpPr/>
+        <p:nvPr/>
+      </p:nvGrpSpPr>
+      <p:grpSpPr>
+        <a:xfrm>
+          <a:off x="0" y="0"/>
+          <a:ext cx="0" cy="0"/>
+          <a:chOff x="0" y="0"/>
+          <a:chExt cx="0" cy="0"/>
+        </a:xfrm>
+      </p:grpSpPr>
+      <p:sp>
+        <p:nvSpPr>
+          <p:cNvPr id="2" name="Образ слайда 1"/>
+          <p:cNvSpPr>
+            <a:spLocks noGrp="1" noRot="1" noChangeAspect="1"/>
+          </p:cNvSpPr>
+          <p:nvPr>
+            <p:ph type="sldImg"/>
+          </p:nvPr>
+        </p:nvSpPr>
+        <p:spPr/>
+      </p:sp>
+      <p:sp>
+        <p:nvSpPr>
+          <p:cNvPr id="3" name="Заметки 2"/>
+          <p:cNvSpPr>
+            <a:spLocks noGrp="1"/>
+          </p:cNvSpPr>
+          <p:nvPr>
+            <p:ph type="body" idx="1"/>
+          </p:nvPr>
+        </p:nvSpPr>
+        <p:spPr/>
+        <p:txBody>
+          <a:bodyPr/>
+          <a:lstStyle/>
+          <a:p>
+            <a:pPr marL="171450" indent="-171450">
+              <a:buFontTx/>
+              <a:buChar char="-"/>
+            </a:pPr>
+            <a:r>
+              <a:rPr lang="en-US" dirty="0" smtClean="0"/>
+              <a:t>GTK+</a:t>
+            </a:r>
+          </a:p>
+          <a:p>
+            <a:pPr marL="171450" indent="-171450">
+              <a:buFontTx/>
+              <a:buChar char="-"/>
+            </a:pPr>
+            <a:r>
+              <a:rPr lang="en-US" dirty="0" err="1" smtClean="0"/>
+              <a:t>Qt</a:t>
+            </a:r>
+            <a:endParaRPr lang="en-US" dirty="0" smtClean="0"/>
+          </a:p>
+          <a:p>
+            <a:pPr marL="171450" indent="-171450">
+              <a:buFontTx/>
+              <a:buChar char="-"/>
+            </a:pPr>
+            <a:r>
+              <a:rPr lang="en-US" dirty="0" err="1" smtClean="0"/>
+              <a:t>wxWidgets</a:t>
+            </a:r>
+            <a:endParaRPr lang="en-US" dirty="0" smtClean="0"/>
+          </a:p>
+          <a:p>
+            <a:pPr marL="171450" indent="-171450">
+              <a:buFontTx/>
+              <a:buChar char="-"/>
+            </a:pPr>
+            <a:r>
+              <a:rPr lang="en-US" dirty="0" smtClean="0"/>
+              <a:t>Swing</a:t>
+            </a:r>
+          </a:p>
+          <a:p>
+            <a:pPr marL="171450" indent="-171450">
+              <a:buFontTx/>
+              <a:buChar char="-"/>
+            </a:pPr>
+            <a:r>
+              <a:rPr lang="en-US" dirty="0" smtClean="0"/>
+              <a:t>SWT</a:t>
+            </a:r>
+          </a:p>
+          <a:p>
+            <a:pPr marL="171450" indent="-171450">
+              <a:buFontTx/>
+              <a:buChar char="-"/>
+            </a:pPr>
+            <a:endParaRPr lang="ru-RU" dirty="0"/>
+          </a:p>
+        </p:txBody>
+      </p:sp>
+      <p:sp>
+        <p:nvSpPr>
+          <p:cNvPr id="4" name="Номер слайда 3"/>
+          <p:cNvSpPr>
+            <a:spLocks noGrp="1"/>
+          </p:cNvSpPr>
+          <p:nvPr>
+            <p:ph type="sldNum" sz="quarter" idx="10"/>
+          </p:nvPr>
+        </p:nvSpPr>
+        <p:spPr/>
+        <p:txBody>
+          <a:bodyPr/>
+          <a:lstStyle/>
+          <a:p>
+            <a:fld id="{A874FABB-6DBE-47C4-B626-20167906F475}" type="slidenum">
+              <a:rPr lang="en-US" smtClean="0"/>
+              <a:t>6</a:t>
+            </a:fld>
+            <a:endParaRPr lang="en-US"/>
+          </a:p>
+        </p:txBody>
+      </p:sp>
+    </p:spTree>
+    <p:extLst>
+      <p:ext uri="{BB962C8B-B14F-4D97-AF65-F5344CB8AC3E}">
+        <p14:creationId xmlns:p14="http://schemas.microsoft.com/office/powerpoint/2010/main" val="4265055325"/>
+      </p:ext>
+    </p:extLst>
+  </p:cSld>
+  <p:clrMapOvr>
+    <a:masterClrMapping/>
+  </p:clrMapOvr>
+</p:notes>
+</file>
+
+<file path=ppt/notesSlides/notesSlide4.xml><?xml version="1.0" encoding="utf-8"?>
+<p:notes xmlns:a="http://schemas.openxmlformats.org/drawingml/2006/main" xmlns:r="http://schemas.openxmlformats.org/officeDocument/2006/relationships" xmlns:p="http://schemas.openxmlformats.org/presentationml/2006/main">
+  <p:cSld>
+    <p:spTree>
+      <p:nvGrpSpPr>
+        <p:cNvPr id="1" name=""/>
+        <p:cNvGrpSpPr/>
+        <p:nvPr/>
+      </p:nvGrpSpPr>
+      <p:grpSpPr>
+        <a:xfrm>
+          <a:off x="0" y="0"/>
+          <a:ext cx="0" cy="0"/>
+          <a:chOff x="0" y="0"/>
+          <a:chExt cx="0" cy="0"/>
+        </a:xfrm>
+      </p:grpSpPr>
+      <p:sp>
+        <p:nvSpPr>
+          <p:cNvPr id="2" name="Образ слайда 1"/>
+          <p:cNvSpPr>
+            <a:spLocks noGrp="1" noRot="1" noChangeAspect="1"/>
+          </p:cNvSpPr>
+          <p:nvPr>
+            <p:ph type="sldImg"/>
+          </p:nvPr>
+        </p:nvSpPr>
+        <p:spPr/>
+      </p:sp>
+      <p:sp>
+        <p:nvSpPr>
+          <p:cNvPr id="3" name="Заметки 2"/>
+          <p:cNvSpPr>
+            <a:spLocks noGrp="1"/>
+          </p:cNvSpPr>
+          <p:nvPr>
+            <p:ph type="body" idx="1"/>
+          </p:nvPr>
+        </p:nvSpPr>
+        <p:spPr/>
+        <p:txBody>
+          <a:bodyPr/>
+          <a:lstStyle/>
+          <a:p>
+            <a:r>
+              <a:rPr lang="en-US" dirty="0" err="1" smtClean="0"/>
+              <a:t>Qt</a:t>
+            </a:r>
+            <a:r>
+              <a:rPr lang="en-US" dirty="0" smtClean="0"/>
+              <a:t> Sharp?</a:t>
+            </a:r>
+            <a:endParaRPr lang="ru-RU" dirty="0"/>
+          </a:p>
+        </p:txBody>
+      </p:sp>
+      <p:sp>
+        <p:nvSpPr>
+          <p:cNvPr id="4" name="Номер слайда 3"/>
+          <p:cNvSpPr>
+            <a:spLocks noGrp="1"/>
+          </p:cNvSpPr>
+          <p:nvPr>
+            <p:ph type="sldNum" sz="quarter" idx="10"/>
+          </p:nvPr>
+        </p:nvSpPr>
+        <p:spPr/>
+        <p:txBody>
+          <a:bodyPr/>
+          <a:lstStyle/>
+          <a:p>
+            <a:fld id="{A874FABB-6DBE-47C4-B626-20167906F475}" type="slidenum">
+              <a:rPr lang="en-US" smtClean="0"/>
+              <a:t>10</a:t>
+            </a:fld>
+            <a:endParaRPr lang="en-US"/>
+          </a:p>
+        </p:txBody>
+      </p:sp>
+    </p:spTree>
+    <p:extLst>
+      <p:ext uri="{BB962C8B-B14F-4D97-AF65-F5344CB8AC3E}">
+        <p14:creationId xmlns:p14="http://schemas.microsoft.com/office/powerpoint/2010/main" val="4251630677"/>
+      </p:ext>
+    </p:extLst>
+  </p:cSld>
+  <p:clrMapOvr>
+    <a:masterClrMapping/>
+  </p:clrMapOvr>
+</p:notes>
+</file>
+
 <file path=ppt/slideLayouts/slideLayout1.xml><?xml version="1.0" encoding="utf-8"?>
 <p:sldLayout xmlns:a="http://schemas.openxmlformats.org/drawingml/2006/main" xmlns:r="http://schemas.openxmlformats.org/officeDocument/2006/relationships" xmlns:p="http://schemas.openxmlformats.org/presentationml/2006/main" preserve="1" userDrawn="1">
   <p:cSld name="Cover">
@@ -6595,7 +7066,7 @@
           </a:ln>
           <a:extLst>
             <a:ext uri="{C572A759-6A51-4108-AA02-DFA0A04FC94B}">
-              <ma14:wrappingTextBoxFlag xmlns:ma14="http://schemas.microsoft.com/office/mac/drawingml/2011/main" xmlns="" val="1"/>
+              <ma14:wrappingTextBoxFlag xmlns="" xmlns:ma14="http://schemas.microsoft.com/office/mac/drawingml/2011/main" val="1"/>
             </a:ext>
           </a:extLst>
         </p:spPr>
@@ -15399,13 +15870,7 @@
       </p:grpSpPr>
       <p:sp>
         <p:nvSpPr>
-          <p:cNvPr id="3" name="Title 2">
-            <a:extLst>
-              <a:ext uri="{FF2B5EF4-FFF2-40B4-BE49-F238E27FC236}">
-                <a16:creationId xmlns:a16="http://schemas.microsoft.com/office/drawing/2014/main" id="{D3362E7D-0D9F-4238-B604-2CFC87ACD634}"/>
-              </a:ext>
-            </a:extLst>
-          </p:cNvPr>
+          <p:cNvPr id="2" name="Заголовок 1"/>
           <p:cNvSpPr>
             <a:spLocks noGrp="1"/>
           </p:cNvSpPr>
@@ -15418,14 +15883,18 @@
           <a:bodyPr/>
           <a:lstStyle/>
           <a:p>
-            <a:endParaRPr lang="en-US"/>
+            <a:r>
+              <a:rPr lang="en-US" dirty="0" err="1" smtClean="0"/>
+              <a:t>Qml.Net</a:t>
+            </a:r>
+            <a:endParaRPr lang="ru-RU" dirty="0"/>
           </a:p>
         </p:txBody>
       </p:sp>
     </p:spTree>
     <p:extLst>
       <p:ext uri="{BB962C8B-B14F-4D97-AF65-F5344CB8AC3E}">
-        <p14:creationId xmlns:p14="http://schemas.microsoft.com/office/powerpoint/2010/main" val="3387644096"/>
+        <p14:creationId xmlns:p14="http://schemas.microsoft.com/office/powerpoint/2010/main" val="3633928373"/>
       </p:ext>
     </p:extLst>
   </p:cSld>
@@ -15454,13 +15923,7 @@
       </p:grpSpPr>
       <p:sp>
         <p:nvSpPr>
-          <p:cNvPr id="2" name="Title 1">
-            <a:extLst>
-              <a:ext uri="{FF2B5EF4-FFF2-40B4-BE49-F238E27FC236}">
-                <a16:creationId xmlns:a16="http://schemas.microsoft.com/office/drawing/2014/main" id="{B100DCF6-B142-4509-8B6C-16DF1907BA0F}"/>
-              </a:ext>
-            </a:extLst>
-          </p:cNvPr>
+          <p:cNvPr id="3" name="Заголовок 2"/>
           <p:cNvSpPr>
             <a:spLocks noGrp="1"/>
           </p:cNvSpPr>
@@ -15473,107 +15936,30 @@
           <a:bodyPr/>
           <a:lstStyle/>
           <a:p>
-            <a:endParaRPr lang="en-US"/>
-          </a:p>
-        </p:txBody>
-      </p:sp>
-      <p:sp>
-        <p:nvSpPr>
-          <p:cNvPr id="3" name="Picture Placeholder 2">
-            <a:extLst>
-              <a:ext uri="{FF2B5EF4-FFF2-40B4-BE49-F238E27FC236}">
-                <a16:creationId xmlns:a16="http://schemas.microsoft.com/office/drawing/2014/main" id="{A493581F-CBA0-4EC4-AF18-5198BC5F5D18}"/>
-              </a:ext>
-            </a:extLst>
-          </p:cNvPr>
-          <p:cNvSpPr>
-            <a:spLocks noGrp="1"/>
-          </p:cNvSpPr>
-          <p:nvPr>
-            <p:ph type="pic" sz="quarter" idx="11"/>
-          </p:nvPr>
-        </p:nvSpPr>
-        <p:spPr/>
-      </p:sp>
-      <p:sp>
-        <p:nvSpPr>
-          <p:cNvPr id="4" name="Text Placeholder 3">
-            <a:extLst>
-              <a:ext uri="{FF2B5EF4-FFF2-40B4-BE49-F238E27FC236}">
-                <a16:creationId xmlns:a16="http://schemas.microsoft.com/office/drawing/2014/main" id="{494DC188-A8EA-4925-BA04-692BBA913B15}"/>
-              </a:ext>
-            </a:extLst>
-          </p:cNvPr>
-          <p:cNvSpPr>
-            <a:spLocks noGrp="1"/>
-          </p:cNvSpPr>
-          <p:nvPr>
-            <p:ph type="body" sz="quarter" idx="12"/>
-          </p:nvPr>
-        </p:nvSpPr>
-        <p:spPr/>
-        <p:txBody>
-          <a:bodyPr/>
-          <a:lstStyle/>
-          <a:p>
-            <a:endParaRPr lang="en-US"/>
-          </a:p>
-        </p:txBody>
-      </p:sp>
-      <p:sp>
-        <p:nvSpPr>
-          <p:cNvPr id="5" name="Content Placeholder 4">
-            <a:extLst>
-              <a:ext uri="{FF2B5EF4-FFF2-40B4-BE49-F238E27FC236}">
-                <a16:creationId xmlns:a16="http://schemas.microsoft.com/office/drawing/2014/main" id="{F26EF6AC-7E4A-4B49-A397-73ABDA127F2C}"/>
-              </a:ext>
-            </a:extLst>
-          </p:cNvPr>
-          <p:cNvSpPr>
-            <a:spLocks noGrp="1"/>
-          </p:cNvSpPr>
-          <p:nvPr>
-            <p:ph sz="quarter" idx="10"/>
-          </p:nvPr>
-        </p:nvSpPr>
-        <p:spPr/>
-        <p:txBody>
-          <a:bodyPr/>
-          <a:lstStyle/>
-          <a:p>
-            <a:endParaRPr lang="en-US"/>
-          </a:p>
-        </p:txBody>
-      </p:sp>
-      <p:sp>
-        <p:nvSpPr>
-          <p:cNvPr id="6" name="Text Placeholder 5">
-            <a:extLst>
-              <a:ext uri="{FF2B5EF4-FFF2-40B4-BE49-F238E27FC236}">
-                <a16:creationId xmlns:a16="http://schemas.microsoft.com/office/drawing/2014/main" id="{A92B7575-B558-4253-846F-86C9F104EB44}"/>
-              </a:ext>
-            </a:extLst>
-          </p:cNvPr>
-          <p:cNvSpPr>
-            <a:spLocks noGrp="1"/>
-          </p:cNvSpPr>
-          <p:nvPr>
-            <p:ph type="body" sz="quarter" idx="13"/>
-          </p:nvPr>
-        </p:nvSpPr>
-        <p:spPr/>
-        <p:txBody>
-          <a:bodyPr/>
-          <a:lstStyle/>
-          <a:p>
-            <a:endParaRPr lang="en-US"/>
+            <a:r>
+              <a:rPr lang="en-US" dirty="0"/>
+              <a:t>Native </a:t>
+            </a:r>
+            <a:r>
+              <a:rPr lang="en-US" dirty="0" err="1"/>
+              <a:t>.Net</a:t>
+            </a:r>
+            <a:r>
+              <a:rPr lang="en-US" dirty="0"/>
+              <a:t> </a:t>
+            </a:r>
+            <a:r>
+              <a:rPr lang="en-US" dirty="0" smtClean="0"/>
+              <a:t>libs</a:t>
+            </a:r>
+            <a:endParaRPr lang="ru-RU" dirty="0"/>
           </a:p>
         </p:txBody>
       </p:sp>
     </p:spTree>
     <p:extLst>
       <p:ext uri="{BB962C8B-B14F-4D97-AF65-F5344CB8AC3E}">
-        <p14:creationId xmlns:p14="http://schemas.microsoft.com/office/powerpoint/2010/main" val="3573495367"/>
+        <p14:creationId xmlns:p14="http://schemas.microsoft.com/office/powerpoint/2010/main" val="186989479"/>
       </p:ext>
     </p:extLst>
   </p:cSld>
@@ -15602,13 +15988,7 @@
       </p:grpSpPr>
       <p:sp>
         <p:nvSpPr>
-          <p:cNvPr id="7" name="Title 6">
-            <a:extLst>
-              <a:ext uri="{FF2B5EF4-FFF2-40B4-BE49-F238E27FC236}">
-                <a16:creationId xmlns:a16="http://schemas.microsoft.com/office/drawing/2014/main" id="{3E0D6084-A18D-4C97-B4B5-7554ADD1DE4D}"/>
-              </a:ext>
-            </a:extLst>
-          </p:cNvPr>
+          <p:cNvPr id="3" name="Заголовок 2"/>
           <p:cNvSpPr>
             <a:spLocks noGrp="1"/>
           </p:cNvSpPr>
@@ -15621,14 +16001,18 @@
           <a:bodyPr/>
           <a:lstStyle/>
           <a:p>
-            <a:endParaRPr lang="en-US"/>
+            <a:r>
+              <a:rPr lang="en-US" dirty="0" smtClean="0"/>
+              <a:t>What is it?</a:t>
+            </a:r>
+            <a:endParaRPr lang="ru-RU" dirty="0"/>
           </a:p>
         </p:txBody>
       </p:sp>
     </p:spTree>
     <p:extLst>
       <p:ext uri="{BB962C8B-B14F-4D97-AF65-F5344CB8AC3E}">
-        <p14:creationId xmlns:p14="http://schemas.microsoft.com/office/powerpoint/2010/main" val="1798980938"/>
+        <p14:creationId xmlns:p14="http://schemas.microsoft.com/office/powerpoint/2010/main" val="609591635"/>
       </p:ext>
     </p:extLst>
   </p:cSld>
@@ -15657,13 +16041,7 @@
       </p:grpSpPr>
       <p:sp>
         <p:nvSpPr>
-          <p:cNvPr id="2" name="Title 1">
-            <a:extLst>
-              <a:ext uri="{FF2B5EF4-FFF2-40B4-BE49-F238E27FC236}">
-                <a16:creationId xmlns:a16="http://schemas.microsoft.com/office/drawing/2014/main" id="{1A2F23A1-1526-43AD-9775-6834247246AA}"/>
-              </a:ext>
-            </a:extLst>
-          </p:cNvPr>
+          <p:cNvPr id="2" name="Заголовок 1"/>
           <p:cNvSpPr>
             <a:spLocks noGrp="1"/>
           </p:cNvSpPr>
@@ -15676,14 +16054,336 @@
           <a:bodyPr/>
           <a:lstStyle/>
           <a:p>
-            <a:endParaRPr lang="en-US"/>
+            <a:r>
+              <a:rPr lang="en-US" dirty="0" smtClean="0"/>
+              <a:t>Avalonia</a:t>
+            </a:r>
+            <a:endParaRPr lang="ru-RU" dirty="0"/>
           </a:p>
         </p:txBody>
       </p:sp>
     </p:spTree>
     <p:extLst>
       <p:ext uri="{BB962C8B-B14F-4D97-AF65-F5344CB8AC3E}">
-        <p14:creationId xmlns:p14="http://schemas.microsoft.com/office/powerpoint/2010/main" val="3511356394"/>
+        <p14:creationId xmlns:p14="http://schemas.microsoft.com/office/powerpoint/2010/main" val="3009376098"/>
+      </p:ext>
+    </p:extLst>
+  </p:cSld>
+  <p:clrMapOvr>
+    <a:masterClrMapping/>
+  </p:clrMapOvr>
+</p:sld>
+</file>
+
+<file path=ppt/slides/slide14.xml><?xml version="1.0" encoding="utf-8"?>
+<p:sld xmlns:a="http://schemas.openxmlformats.org/drawingml/2006/main" xmlns:r="http://schemas.openxmlformats.org/officeDocument/2006/relationships" xmlns:p="http://schemas.openxmlformats.org/presentationml/2006/main">
+  <p:cSld>
+    <p:spTree>
+      <p:nvGrpSpPr>
+        <p:cNvPr id="1" name=""/>
+        <p:cNvGrpSpPr/>
+        <p:nvPr/>
+      </p:nvGrpSpPr>
+      <p:grpSpPr>
+        <a:xfrm>
+          <a:off x="0" y="0"/>
+          <a:ext cx="0" cy="0"/>
+          <a:chOff x="0" y="0"/>
+          <a:chExt cx="0" cy="0"/>
+        </a:xfrm>
+      </p:grpSpPr>
+      <p:sp>
+        <p:nvSpPr>
+          <p:cNvPr id="2" name="Заголовок 1"/>
+          <p:cNvSpPr>
+            <a:spLocks noGrp="1"/>
+          </p:cNvSpPr>
+          <p:nvPr>
+            <p:ph type="title"/>
+          </p:nvPr>
+        </p:nvSpPr>
+        <p:spPr/>
+        <p:txBody>
+          <a:bodyPr/>
+          <a:lstStyle/>
+          <a:p>
+            <a:r>
+              <a:rPr lang="en-US" dirty="0" err="1" smtClean="0"/>
+              <a:t>Eto.Forms</a:t>
+            </a:r>
+            <a:endParaRPr lang="ru-RU" dirty="0"/>
+          </a:p>
+        </p:txBody>
+      </p:sp>
+    </p:spTree>
+    <p:extLst>
+      <p:ext uri="{BB962C8B-B14F-4D97-AF65-F5344CB8AC3E}">
+        <p14:creationId xmlns:p14="http://schemas.microsoft.com/office/powerpoint/2010/main" val="1058019614"/>
+      </p:ext>
+    </p:extLst>
+  </p:cSld>
+  <p:clrMapOvr>
+    <a:masterClrMapping/>
+  </p:clrMapOvr>
+</p:sld>
+</file>
+
+<file path=ppt/slides/slide15.xml><?xml version="1.0" encoding="utf-8"?>
+<p:sld xmlns:a="http://schemas.openxmlformats.org/drawingml/2006/main" xmlns:r="http://schemas.openxmlformats.org/officeDocument/2006/relationships" xmlns:p="http://schemas.openxmlformats.org/presentationml/2006/main">
+  <p:cSld>
+    <p:spTree>
+      <p:nvGrpSpPr>
+        <p:cNvPr id="1" name=""/>
+        <p:cNvGrpSpPr/>
+        <p:nvPr/>
+      </p:nvGrpSpPr>
+      <p:grpSpPr>
+        <a:xfrm>
+          <a:off x="0" y="0"/>
+          <a:ext cx="0" cy="0"/>
+          <a:chOff x="0" y="0"/>
+          <a:chExt cx="0" cy="0"/>
+        </a:xfrm>
+      </p:grpSpPr>
+      <p:sp>
+        <p:nvSpPr>
+          <p:cNvPr id="3" name="Заголовок 2"/>
+          <p:cNvSpPr>
+            <a:spLocks noGrp="1"/>
+          </p:cNvSpPr>
+          <p:nvPr>
+            <p:ph type="title"/>
+          </p:nvPr>
+        </p:nvSpPr>
+        <p:spPr/>
+        <p:txBody>
+          <a:bodyPr/>
+          <a:lstStyle/>
+          <a:p>
+            <a:r>
+              <a:rPr lang="en-US" dirty="0" smtClean="0"/>
+              <a:t>HTML/CSS-based frameworks</a:t>
+            </a:r>
+            <a:endParaRPr lang="ru-RU" dirty="0"/>
+          </a:p>
+        </p:txBody>
+      </p:sp>
+    </p:spTree>
+    <p:extLst>
+      <p:ext uri="{BB962C8B-B14F-4D97-AF65-F5344CB8AC3E}">
+        <p14:creationId xmlns:p14="http://schemas.microsoft.com/office/powerpoint/2010/main" val="1456736141"/>
+      </p:ext>
+    </p:extLst>
+  </p:cSld>
+  <p:clrMapOvr>
+    <a:masterClrMapping/>
+  </p:clrMapOvr>
+</p:sld>
+</file>
+
+<file path=ppt/slides/slide16.xml><?xml version="1.0" encoding="utf-8"?>
+<p:sld xmlns:a="http://schemas.openxmlformats.org/drawingml/2006/main" xmlns:r="http://schemas.openxmlformats.org/officeDocument/2006/relationships" xmlns:p="http://schemas.openxmlformats.org/presentationml/2006/main">
+  <p:cSld>
+    <p:spTree>
+      <p:nvGrpSpPr>
+        <p:cNvPr id="1" name=""/>
+        <p:cNvGrpSpPr/>
+        <p:nvPr/>
+      </p:nvGrpSpPr>
+      <p:grpSpPr>
+        <a:xfrm>
+          <a:off x="0" y="0"/>
+          <a:ext cx="0" cy="0"/>
+          <a:chOff x="0" y="0"/>
+          <a:chExt cx="0" cy="0"/>
+        </a:xfrm>
+      </p:grpSpPr>
+      <p:sp>
+        <p:nvSpPr>
+          <p:cNvPr id="3" name="Заголовок 2"/>
+          <p:cNvSpPr>
+            <a:spLocks noGrp="1"/>
+          </p:cNvSpPr>
+          <p:nvPr>
+            <p:ph type="title"/>
+          </p:nvPr>
+        </p:nvSpPr>
+        <p:spPr/>
+        <p:txBody>
+          <a:bodyPr/>
+          <a:lstStyle/>
+          <a:p>
+            <a:r>
+              <a:rPr lang="en-US" dirty="0" smtClean="0"/>
+              <a:t>What is it?</a:t>
+            </a:r>
+            <a:endParaRPr lang="ru-RU" dirty="0"/>
+          </a:p>
+        </p:txBody>
+      </p:sp>
+    </p:spTree>
+    <p:extLst>
+      <p:ext uri="{BB962C8B-B14F-4D97-AF65-F5344CB8AC3E}">
+        <p14:creationId xmlns:p14="http://schemas.microsoft.com/office/powerpoint/2010/main" val="3509164491"/>
+      </p:ext>
+    </p:extLst>
+  </p:cSld>
+  <p:clrMapOvr>
+    <a:masterClrMapping/>
+  </p:clrMapOvr>
+</p:sld>
+</file>
+
+<file path=ppt/slides/slide17.xml><?xml version="1.0" encoding="utf-8"?>
+<p:sld xmlns:a="http://schemas.openxmlformats.org/drawingml/2006/main" xmlns:r="http://schemas.openxmlformats.org/officeDocument/2006/relationships" xmlns:p="http://schemas.openxmlformats.org/presentationml/2006/main">
+  <p:cSld>
+    <p:spTree>
+      <p:nvGrpSpPr>
+        <p:cNvPr id="1" name=""/>
+        <p:cNvGrpSpPr/>
+        <p:nvPr/>
+      </p:nvGrpSpPr>
+      <p:grpSpPr>
+        <a:xfrm>
+          <a:off x="0" y="0"/>
+          <a:ext cx="0" cy="0"/>
+          <a:chOff x="0" y="0"/>
+          <a:chExt cx="0" cy="0"/>
+        </a:xfrm>
+      </p:grpSpPr>
+      <p:sp>
+        <p:nvSpPr>
+          <p:cNvPr id="2" name="Заголовок 1"/>
+          <p:cNvSpPr>
+            <a:spLocks noGrp="1"/>
+          </p:cNvSpPr>
+          <p:nvPr>
+            <p:ph type="title"/>
+          </p:nvPr>
+        </p:nvSpPr>
+        <p:spPr/>
+        <p:txBody>
+          <a:bodyPr/>
+          <a:lstStyle/>
+          <a:p>
+            <a:r>
+              <a:rPr lang="en-US" dirty="0" smtClean="0"/>
+              <a:t>Electron</a:t>
+            </a:r>
+            <a:endParaRPr lang="ru-RU" dirty="0"/>
+          </a:p>
+        </p:txBody>
+      </p:sp>
+    </p:spTree>
+    <p:extLst>
+      <p:ext uri="{BB962C8B-B14F-4D97-AF65-F5344CB8AC3E}">
+        <p14:creationId xmlns:p14="http://schemas.microsoft.com/office/powerpoint/2010/main" val="3635802564"/>
+      </p:ext>
+    </p:extLst>
+  </p:cSld>
+  <p:clrMapOvr>
+    <a:masterClrMapping/>
+  </p:clrMapOvr>
+</p:sld>
+</file>
+
+<file path=ppt/slides/slide18.xml><?xml version="1.0" encoding="utf-8"?>
+<p:sld xmlns:a="http://schemas.openxmlformats.org/drawingml/2006/main" xmlns:r="http://schemas.openxmlformats.org/officeDocument/2006/relationships" xmlns:p="http://schemas.openxmlformats.org/presentationml/2006/main">
+  <p:cSld>
+    <p:spTree>
+      <p:nvGrpSpPr>
+        <p:cNvPr id="1" name=""/>
+        <p:cNvGrpSpPr/>
+        <p:nvPr/>
+      </p:nvGrpSpPr>
+      <p:grpSpPr>
+        <a:xfrm>
+          <a:off x="0" y="0"/>
+          <a:ext cx="0" cy="0"/>
+          <a:chOff x="0" y="0"/>
+          <a:chExt cx="0" cy="0"/>
+        </a:xfrm>
+      </p:grpSpPr>
+      <p:sp>
+        <p:nvSpPr>
+          <p:cNvPr id="2" name="Заголовок 1"/>
+          <p:cNvSpPr>
+            <a:spLocks noGrp="1"/>
+          </p:cNvSpPr>
+          <p:nvPr>
+            <p:ph type="title"/>
+          </p:nvPr>
+        </p:nvSpPr>
+        <p:spPr/>
+        <p:txBody>
+          <a:bodyPr/>
+          <a:lstStyle/>
+          <a:p>
+            <a:r>
+              <a:rPr lang="en-US" dirty="0" smtClean="0"/>
+              <a:t>Electron.net</a:t>
+            </a:r>
+            <a:endParaRPr lang="ru-RU" dirty="0"/>
+          </a:p>
+        </p:txBody>
+      </p:sp>
+    </p:spTree>
+    <p:extLst>
+      <p:ext uri="{BB962C8B-B14F-4D97-AF65-F5344CB8AC3E}">
+        <p14:creationId xmlns:p14="http://schemas.microsoft.com/office/powerpoint/2010/main" val="2718629126"/>
+      </p:ext>
+    </p:extLst>
+  </p:cSld>
+  <p:clrMapOvr>
+    <a:masterClrMapping/>
+  </p:clrMapOvr>
+</p:sld>
+</file>
+
+<file path=ppt/slides/slide19.xml><?xml version="1.0" encoding="utf-8"?>
+<p:sld xmlns:a="http://schemas.openxmlformats.org/drawingml/2006/main" xmlns:r="http://schemas.openxmlformats.org/officeDocument/2006/relationships" xmlns:p="http://schemas.openxmlformats.org/presentationml/2006/main">
+  <p:cSld>
+    <p:spTree>
+      <p:nvGrpSpPr>
+        <p:cNvPr id="1" name=""/>
+        <p:cNvGrpSpPr/>
+        <p:nvPr/>
+      </p:nvGrpSpPr>
+      <p:grpSpPr>
+        <a:xfrm>
+          <a:off x="0" y="0"/>
+          <a:ext cx="0" cy="0"/>
+          <a:chOff x="0" y="0"/>
+          <a:chExt cx="0" cy="0"/>
+        </a:xfrm>
+      </p:grpSpPr>
+      <p:sp>
+        <p:nvSpPr>
+          <p:cNvPr id="2" name="Заголовок 1"/>
+          <p:cNvSpPr>
+            <a:spLocks noGrp="1"/>
+          </p:cNvSpPr>
+          <p:nvPr>
+            <p:ph type="title"/>
+          </p:nvPr>
+        </p:nvSpPr>
+        <p:spPr/>
+        <p:txBody>
+          <a:bodyPr/>
+          <a:lstStyle/>
+          <a:p>
+            <a:r>
+              <a:rPr lang="en-US" dirty="0" err="1" smtClean="0"/>
+              <a:t>Sciter</a:t>
+            </a:r>
+            <a:endParaRPr lang="ru-RU" dirty="0"/>
+          </a:p>
+        </p:txBody>
+      </p:sp>
+    </p:spTree>
+    <p:extLst>
+      <p:ext uri="{BB962C8B-B14F-4D97-AF65-F5344CB8AC3E}">
+        <p14:creationId xmlns:p14="http://schemas.microsoft.com/office/powerpoint/2010/main" val="1096656507"/>
       </p:ext>
     </p:extLst>
   </p:cSld>
@@ -15823,6 +16523,220 @@
 </p:sld>
 </file>
 
+<file path=ppt/slides/slide20.xml><?xml version="1.0" encoding="utf-8"?>
+<p:sld xmlns:a="http://schemas.openxmlformats.org/drawingml/2006/main" xmlns:r="http://schemas.openxmlformats.org/officeDocument/2006/relationships" xmlns:p="http://schemas.openxmlformats.org/presentationml/2006/main">
+  <p:cSld>
+    <p:spTree>
+      <p:nvGrpSpPr>
+        <p:cNvPr id="1" name=""/>
+        <p:cNvGrpSpPr/>
+        <p:nvPr/>
+      </p:nvGrpSpPr>
+      <p:grpSpPr>
+        <a:xfrm>
+          <a:off x="0" y="0"/>
+          <a:ext cx="0" cy="0"/>
+          <a:chOff x="0" y="0"/>
+          <a:chExt cx="0" cy="0"/>
+        </a:xfrm>
+      </p:grpSpPr>
+      <p:sp>
+        <p:nvSpPr>
+          <p:cNvPr id="2" name="Заголовок 1"/>
+          <p:cNvSpPr>
+            <a:spLocks noGrp="1"/>
+          </p:cNvSpPr>
+          <p:nvPr>
+            <p:ph type="title"/>
+          </p:nvPr>
+        </p:nvSpPr>
+        <p:spPr/>
+        <p:txBody>
+          <a:bodyPr/>
+          <a:lstStyle/>
+          <a:p>
+            <a:r>
+              <a:rPr lang="en-US" dirty="0" err="1"/>
+              <a:t>SciterSharp</a:t>
+            </a:r>
+            <a:endParaRPr lang="ru-RU" dirty="0"/>
+          </a:p>
+        </p:txBody>
+      </p:sp>
+    </p:spTree>
+    <p:extLst>
+      <p:ext uri="{BB962C8B-B14F-4D97-AF65-F5344CB8AC3E}">
+        <p14:creationId xmlns:p14="http://schemas.microsoft.com/office/powerpoint/2010/main" val="2270255873"/>
+      </p:ext>
+    </p:extLst>
+  </p:cSld>
+  <p:clrMapOvr>
+    <a:masterClrMapping/>
+  </p:clrMapOvr>
+</p:sld>
+</file>
+
+<file path=ppt/slides/slide21.xml><?xml version="1.0" encoding="utf-8"?>
+<p:sld xmlns:a="http://schemas.openxmlformats.org/drawingml/2006/main" xmlns:r="http://schemas.openxmlformats.org/officeDocument/2006/relationships" xmlns:p="http://schemas.openxmlformats.org/presentationml/2006/main">
+  <p:cSld>
+    <p:spTree>
+      <p:nvGrpSpPr>
+        <p:cNvPr id="1" name=""/>
+        <p:cNvGrpSpPr/>
+        <p:nvPr/>
+      </p:nvGrpSpPr>
+      <p:grpSpPr>
+        <a:xfrm>
+          <a:off x="0" y="0"/>
+          <a:ext cx="0" cy="0"/>
+          <a:chOff x="0" y="0"/>
+          <a:chExt cx="0" cy="0"/>
+        </a:xfrm>
+      </p:grpSpPr>
+      <p:sp>
+        <p:nvSpPr>
+          <p:cNvPr id="7" name="Title 6">
+            <a:extLst>
+              <a:ext uri="{FF2B5EF4-FFF2-40B4-BE49-F238E27FC236}">
+                <a16:creationId xmlns:a16="http://schemas.microsoft.com/office/drawing/2014/main" id="{3E0D6084-A18D-4C97-B4B5-7554ADD1DE4D}"/>
+              </a:ext>
+            </a:extLst>
+          </p:cNvPr>
+          <p:cNvSpPr>
+            <a:spLocks noGrp="1"/>
+          </p:cNvSpPr>
+          <p:nvPr>
+            <p:ph type="title"/>
+          </p:nvPr>
+        </p:nvSpPr>
+        <p:spPr/>
+        <p:txBody>
+          <a:bodyPr/>
+          <a:lstStyle/>
+          <a:p>
+            <a:r>
+              <a:rPr lang="en-US" dirty="0"/>
+              <a:t>Conclusions</a:t>
+            </a:r>
+            <a:endParaRPr lang="en-US" dirty="0"/>
+          </a:p>
+        </p:txBody>
+      </p:sp>
+    </p:spTree>
+    <p:extLst>
+      <p:ext uri="{BB962C8B-B14F-4D97-AF65-F5344CB8AC3E}">
+        <p14:creationId xmlns:p14="http://schemas.microsoft.com/office/powerpoint/2010/main" val="1798980938"/>
+      </p:ext>
+    </p:extLst>
+  </p:cSld>
+  <p:clrMapOvr>
+    <a:masterClrMapping/>
+  </p:clrMapOvr>
+</p:sld>
+</file>
+
+<file path=ppt/slides/slide22.xml><?xml version="1.0" encoding="utf-8"?>
+<p:sld xmlns:a="http://schemas.openxmlformats.org/drawingml/2006/main" xmlns:r="http://schemas.openxmlformats.org/officeDocument/2006/relationships" xmlns:p="http://schemas.openxmlformats.org/presentationml/2006/main">
+  <p:cSld>
+    <p:spTree>
+      <p:nvGrpSpPr>
+        <p:cNvPr id="1" name=""/>
+        <p:cNvGrpSpPr/>
+        <p:nvPr/>
+      </p:nvGrpSpPr>
+      <p:grpSpPr>
+        <a:xfrm>
+          <a:off x="0" y="0"/>
+          <a:ext cx="0" cy="0"/>
+          <a:chOff x="0" y="0"/>
+          <a:chExt cx="0" cy="0"/>
+        </a:xfrm>
+      </p:grpSpPr>
+      <p:sp>
+        <p:nvSpPr>
+          <p:cNvPr id="3" name="Заголовок 2"/>
+          <p:cNvSpPr>
+            <a:spLocks noGrp="1"/>
+          </p:cNvSpPr>
+          <p:nvPr>
+            <p:ph type="title"/>
+          </p:nvPr>
+        </p:nvSpPr>
+        <p:spPr/>
+        <p:txBody>
+          <a:bodyPr/>
+          <a:lstStyle/>
+          <a:p>
+            <a:endParaRPr lang="ru-RU" dirty="0"/>
+          </a:p>
+        </p:txBody>
+      </p:sp>
+    </p:spTree>
+    <p:extLst>
+      <p:ext uri="{BB962C8B-B14F-4D97-AF65-F5344CB8AC3E}">
+        <p14:creationId xmlns:p14="http://schemas.microsoft.com/office/powerpoint/2010/main" val="3878214965"/>
+      </p:ext>
+    </p:extLst>
+  </p:cSld>
+  <p:clrMapOvr>
+    <a:masterClrMapping/>
+  </p:clrMapOvr>
+</p:sld>
+</file>
+
+<file path=ppt/slides/slide23.xml><?xml version="1.0" encoding="utf-8"?>
+<p:sld xmlns:a="http://schemas.openxmlformats.org/drawingml/2006/main" xmlns:r="http://schemas.openxmlformats.org/officeDocument/2006/relationships" xmlns:p="http://schemas.openxmlformats.org/presentationml/2006/main">
+  <p:cSld>
+    <p:spTree>
+      <p:nvGrpSpPr>
+        <p:cNvPr id="1" name=""/>
+        <p:cNvGrpSpPr/>
+        <p:nvPr/>
+      </p:nvGrpSpPr>
+      <p:grpSpPr>
+        <a:xfrm>
+          <a:off x="0" y="0"/>
+          <a:ext cx="0" cy="0"/>
+          <a:chOff x="0" y="0"/>
+          <a:chExt cx="0" cy="0"/>
+        </a:xfrm>
+      </p:grpSpPr>
+      <p:sp>
+        <p:nvSpPr>
+          <p:cNvPr id="3" name="Заголовок 2"/>
+          <p:cNvSpPr>
+            <a:spLocks noGrp="1"/>
+          </p:cNvSpPr>
+          <p:nvPr>
+            <p:ph type="title"/>
+          </p:nvPr>
+        </p:nvSpPr>
+        <p:spPr/>
+        <p:txBody>
+          <a:bodyPr/>
+          <a:lstStyle/>
+          <a:p>
+            <a:r>
+              <a:rPr lang="en-US" dirty="0" smtClean="0"/>
+              <a:t>Your Questions…</a:t>
+            </a:r>
+            <a:endParaRPr lang="ru-RU" dirty="0"/>
+          </a:p>
+        </p:txBody>
+      </p:sp>
+    </p:spTree>
+    <p:extLst>
+      <p:ext uri="{BB962C8B-B14F-4D97-AF65-F5344CB8AC3E}">
+        <p14:creationId xmlns:p14="http://schemas.microsoft.com/office/powerpoint/2010/main" val="863776754"/>
+      </p:ext>
+    </p:extLst>
+  </p:cSld>
+  <p:clrMapOvr>
+    <a:masterClrMapping/>
+  </p:clrMapOvr>
+</p:sld>
+</file>
+
 <file path=ppt/slides/slide3.xml><?xml version="1.0" encoding="utf-8"?>
 <p:sld xmlns:a="http://schemas.openxmlformats.org/drawingml/2006/main" xmlns:r="http://schemas.openxmlformats.org/officeDocument/2006/relationships" xmlns:p="http://schemas.openxmlformats.org/presentationml/2006/main">
   <p:cSld>
@@ -15842,13 +16756,7 @@
       </p:grpSpPr>
       <p:sp>
         <p:nvSpPr>
-          <p:cNvPr id="2" name="Title 1">
-            <a:extLst>
-              <a:ext uri="{FF2B5EF4-FFF2-40B4-BE49-F238E27FC236}">
-                <a16:creationId xmlns:a16="http://schemas.microsoft.com/office/drawing/2014/main" id="{99EE11B7-6A70-4CA7-81FD-96B2D818A642}"/>
-              </a:ext>
-            </a:extLst>
-          </p:cNvPr>
+          <p:cNvPr id="6" name="Заголовок 5"/>
           <p:cNvSpPr>
             <a:spLocks noGrp="1"/>
           </p:cNvSpPr>
@@ -15861,114 +16769,18 @@
           <a:bodyPr/>
           <a:lstStyle/>
           <a:p>
-            <a:endParaRPr lang="en-US"/>
-          </a:p>
-        </p:txBody>
-      </p:sp>
-      <p:sp>
-        <p:nvSpPr>
-          <p:cNvPr id="3" name="Content Placeholder 2">
-            <a:extLst>
-              <a:ext uri="{FF2B5EF4-FFF2-40B4-BE49-F238E27FC236}">
-                <a16:creationId xmlns:a16="http://schemas.microsoft.com/office/drawing/2014/main" id="{3D9DE10E-D022-4B20-A227-FDCB24BF166F}"/>
-              </a:ext>
-            </a:extLst>
-          </p:cNvPr>
-          <p:cNvSpPr>
-            <a:spLocks noGrp="1"/>
-          </p:cNvSpPr>
-          <p:nvPr>
-            <p:ph sz="quarter" idx="10"/>
-          </p:nvPr>
-        </p:nvSpPr>
-        <p:spPr/>
-        <p:txBody>
-          <a:bodyPr/>
-          <a:lstStyle/>
-          <a:p>
-            <a:endParaRPr lang="en-US"/>
-          </a:p>
-        </p:txBody>
-      </p:sp>
-      <p:sp>
-        <p:nvSpPr>
-          <p:cNvPr id="4" name="Text Placeholder 3">
-            <a:extLst>
-              <a:ext uri="{FF2B5EF4-FFF2-40B4-BE49-F238E27FC236}">
-                <a16:creationId xmlns:a16="http://schemas.microsoft.com/office/drawing/2014/main" id="{3EF15AD2-50F4-4271-88B4-6ABEEAC141A2}"/>
-              </a:ext>
-            </a:extLst>
-          </p:cNvPr>
-          <p:cNvSpPr>
-            <a:spLocks noGrp="1"/>
-          </p:cNvSpPr>
-          <p:nvPr>
-            <p:ph type="body" sz="quarter" idx="11"/>
-          </p:nvPr>
-        </p:nvSpPr>
-        <p:spPr/>
-        <p:txBody>
-          <a:bodyPr/>
-          <a:lstStyle/>
-          <a:p>
-            <a:endParaRPr lang="en-US"/>
-          </a:p>
-        </p:txBody>
-      </p:sp>
-      <p:sp>
-        <p:nvSpPr>
-          <p:cNvPr id="5" name="Content Placeholder 4">
-            <a:extLst>
-              <a:ext uri="{FF2B5EF4-FFF2-40B4-BE49-F238E27FC236}">
-                <a16:creationId xmlns:a16="http://schemas.microsoft.com/office/drawing/2014/main" id="{F6536987-9267-49CB-8D9B-16CF5A8E61A6}"/>
-              </a:ext>
-            </a:extLst>
-          </p:cNvPr>
-          <p:cNvSpPr>
-            <a:spLocks noGrp="1"/>
-          </p:cNvSpPr>
-          <p:nvPr>
-            <p:ph sz="quarter" idx="12"/>
-          </p:nvPr>
-        </p:nvSpPr>
-        <p:spPr/>
-        <p:txBody>
-          <a:bodyPr/>
-          <a:lstStyle/>
-          <a:p>
-            <a:endParaRPr lang="en-US"/>
-          </a:p>
-        </p:txBody>
-      </p:sp>
-      <p:sp>
-        <p:nvSpPr>
-          <p:cNvPr id="6" name="Text Placeholder 5">
-            <a:extLst>
-              <a:ext uri="{FF2B5EF4-FFF2-40B4-BE49-F238E27FC236}">
-                <a16:creationId xmlns:a16="http://schemas.microsoft.com/office/drawing/2014/main" id="{95860774-9867-4884-94D9-F9743456B822}"/>
-              </a:ext>
-            </a:extLst>
-          </p:cNvPr>
-          <p:cNvSpPr>
-            <a:spLocks noGrp="1"/>
-          </p:cNvSpPr>
-          <p:nvPr>
-            <p:ph type="body" sz="quarter" idx="13"/>
-          </p:nvPr>
-        </p:nvSpPr>
-        <p:spPr/>
-        <p:txBody>
-          <a:bodyPr/>
-          <a:lstStyle/>
-          <a:p>
-            <a:endParaRPr lang="en-US"/>
+            <a:r>
+              <a:rPr lang="en-US" dirty="0" smtClean="0"/>
+              <a:t>Agenda</a:t>
+            </a:r>
+            <a:endParaRPr lang="ru-RU" dirty="0"/>
           </a:p>
         </p:txBody>
       </p:sp>
     </p:spTree>
     <p:extLst>
       <p:ext uri="{BB962C8B-B14F-4D97-AF65-F5344CB8AC3E}">
-        <p14:creationId xmlns:p14="http://schemas.microsoft.com/office/powerpoint/2010/main" val="2006766614"/>
+        <p14:creationId xmlns:p14="http://schemas.microsoft.com/office/powerpoint/2010/main" val="51419615"/>
       </p:ext>
     </p:extLst>
   </p:cSld>
@@ -15997,13 +16809,7 @@
       </p:grpSpPr>
       <p:sp>
         <p:nvSpPr>
-          <p:cNvPr id="2" name="Title 1">
-            <a:extLst>
-              <a:ext uri="{FF2B5EF4-FFF2-40B4-BE49-F238E27FC236}">
-                <a16:creationId xmlns:a16="http://schemas.microsoft.com/office/drawing/2014/main" id="{68941973-22F3-42B3-B9B6-CD433CDA00AA}"/>
-              </a:ext>
-            </a:extLst>
-          </p:cNvPr>
+          <p:cNvPr id="2" name="Заголовок 1"/>
           <p:cNvSpPr>
             <a:spLocks noGrp="1"/>
           </p:cNvSpPr>
@@ -16016,114 +16822,18 @@
           <a:bodyPr/>
           <a:lstStyle/>
           <a:p>
-            <a:endParaRPr lang="en-US"/>
-          </a:p>
-        </p:txBody>
-      </p:sp>
-      <p:sp>
-        <p:nvSpPr>
-          <p:cNvPr id="3" name="Content Placeholder 2">
-            <a:extLst>
-              <a:ext uri="{FF2B5EF4-FFF2-40B4-BE49-F238E27FC236}">
-                <a16:creationId xmlns:a16="http://schemas.microsoft.com/office/drawing/2014/main" id="{B676504C-A091-4B25-8C23-6DB4BF3AE1D4}"/>
-              </a:ext>
-            </a:extLst>
-          </p:cNvPr>
-          <p:cNvSpPr>
-            <a:spLocks noGrp="1"/>
-          </p:cNvSpPr>
-          <p:nvPr>
-            <p:ph sz="quarter" idx="10"/>
-          </p:nvPr>
-        </p:nvSpPr>
-        <p:spPr/>
-        <p:txBody>
-          <a:bodyPr/>
-          <a:lstStyle/>
-          <a:p>
-            <a:endParaRPr lang="en-US"/>
-          </a:p>
-        </p:txBody>
-      </p:sp>
-      <p:sp>
-        <p:nvSpPr>
-          <p:cNvPr id="4" name="Text Placeholder 3">
-            <a:extLst>
-              <a:ext uri="{FF2B5EF4-FFF2-40B4-BE49-F238E27FC236}">
-                <a16:creationId xmlns:a16="http://schemas.microsoft.com/office/drawing/2014/main" id="{910DB39C-689F-44B6-938B-37B93E8978C0}"/>
-              </a:ext>
-            </a:extLst>
-          </p:cNvPr>
-          <p:cNvSpPr>
-            <a:spLocks noGrp="1"/>
-          </p:cNvSpPr>
-          <p:nvPr>
-            <p:ph type="body" sz="quarter" idx="11"/>
-          </p:nvPr>
-        </p:nvSpPr>
-        <p:spPr/>
-        <p:txBody>
-          <a:bodyPr/>
-          <a:lstStyle/>
-          <a:p>
-            <a:endParaRPr lang="en-US" dirty="0"/>
-          </a:p>
-        </p:txBody>
-      </p:sp>
-      <p:sp>
-        <p:nvSpPr>
-          <p:cNvPr id="5" name="Content Placeholder 4">
-            <a:extLst>
-              <a:ext uri="{FF2B5EF4-FFF2-40B4-BE49-F238E27FC236}">
-                <a16:creationId xmlns:a16="http://schemas.microsoft.com/office/drawing/2014/main" id="{271057DD-A047-41EB-B616-E4F256E3575D}"/>
-              </a:ext>
-            </a:extLst>
-          </p:cNvPr>
-          <p:cNvSpPr>
-            <a:spLocks noGrp="1"/>
-          </p:cNvSpPr>
-          <p:nvPr>
-            <p:ph sz="quarter" idx="12"/>
-          </p:nvPr>
-        </p:nvSpPr>
-        <p:spPr/>
-        <p:txBody>
-          <a:bodyPr/>
-          <a:lstStyle/>
-          <a:p>
-            <a:endParaRPr lang="en-US"/>
-          </a:p>
-        </p:txBody>
-      </p:sp>
-      <p:sp>
-        <p:nvSpPr>
-          <p:cNvPr id="6" name="Text Placeholder 5">
-            <a:extLst>
-              <a:ext uri="{FF2B5EF4-FFF2-40B4-BE49-F238E27FC236}">
-                <a16:creationId xmlns:a16="http://schemas.microsoft.com/office/drawing/2014/main" id="{A01EBDD0-DFA4-43AC-BBBD-36D930C4EBAD}"/>
-              </a:ext>
-            </a:extLst>
-          </p:cNvPr>
-          <p:cNvSpPr>
-            <a:spLocks noGrp="1"/>
-          </p:cNvSpPr>
-          <p:nvPr>
-            <p:ph type="body" sz="quarter" idx="13"/>
-          </p:nvPr>
-        </p:nvSpPr>
-        <p:spPr/>
-        <p:txBody>
-          <a:bodyPr/>
-          <a:lstStyle/>
-          <a:p>
-            <a:endParaRPr lang="en-US"/>
+            <a:r>
+              <a:rPr lang="en-US" dirty="0" smtClean="0"/>
+              <a:t>Types of GUI libs</a:t>
+            </a:r>
+            <a:endParaRPr lang="ru-RU" dirty="0"/>
           </a:p>
         </p:txBody>
       </p:sp>
     </p:spTree>
     <p:extLst>
       <p:ext uri="{BB962C8B-B14F-4D97-AF65-F5344CB8AC3E}">
-        <p14:creationId xmlns:p14="http://schemas.microsoft.com/office/powerpoint/2010/main" val="4041824451"/>
+        <p14:creationId xmlns:p14="http://schemas.microsoft.com/office/powerpoint/2010/main" val="2188833011"/>
       </p:ext>
     </p:extLst>
   </p:cSld>
@@ -16152,18 +16862,12 @@
       </p:grpSpPr>
       <p:sp>
         <p:nvSpPr>
-          <p:cNvPr id="7" name="Content Placeholder 6">
-            <a:extLst>
-              <a:ext uri="{FF2B5EF4-FFF2-40B4-BE49-F238E27FC236}">
-                <a16:creationId xmlns:a16="http://schemas.microsoft.com/office/drawing/2014/main" id="{711744B7-F3DA-4C7D-AF8C-8D2498B41B0A}"/>
-              </a:ext>
-            </a:extLst>
-          </p:cNvPr>
+          <p:cNvPr id="2" name="Заголовок 1"/>
           <p:cNvSpPr>
             <a:spLocks noGrp="1"/>
           </p:cNvSpPr>
           <p:nvPr>
-            <p:ph sz="quarter" idx="12"/>
+            <p:ph type="title"/>
           </p:nvPr>
         </p:nvSpPr>
         <p:spPr/>
@@ -16171,82 +16875,26 @@
           <a:bodyPr/>
           <a:lstStyle/>
           <a:p>
-            <a:endParaRPr lang="en-US"/>
-          </a:p>
-        </p:txBody>
-      </p:sp>
-      <p:sp>
-        <p:nvSpPr>
-          <p:cNvPr id="8" name="Text Placeholder 7">
-            <a:extLst>
-              <a:ext uri="{FF2B5EF4-FFF2-40B4-BE49-F238E27FC236}">
-                <a16:creationId xmlns:a16="http://schemas.microsoft.com/office/drawing/2014/main" id="{AB48A2D4-2F77-44B6-9A3A-0B3A3148EB93}"/>
-              </a:ext>
-            </a:extLst>
-          </p:cNvPr>
-          <p:cNvSpPr>
-            <a:spLocks noGrp="1"/>
-          </p:cNvSpPr>
-          <p:nvPr>
-            <p:ph type="body" sz="quarter" idx="13"/>
-          </p:nvPr>
-        </p:nvSpPr>
-        <p:spPr/>
-        <p:txBody>
-          <a:bodyPr/>
-          <a:lstStyle/>
-          <a:p>
-            <a:endParaRPr lang="en-US"/>
-          </a:p>
-        </p:txBody>
-      </p:sp>
-      <p:sp>
-        <p:nvSpPr>
-          <p:cNvPr id="9" name="Picture Placeholder 8">
-            <a:extLst>
-              <a:ext uri="{FF2B5EF4-FFF2-40B4-BE49-F238E27FC236}">
-                <a16:creationId xmlns:a16="http://schemas.microsoft.com/office/drawing/2014/main" id="{70E144EC-E61D-45A1-BB5D-E3BFEC15FBE8}"/>
-              </a:ext>
-            </a:extLst>
-          </p:cNvPr>
-          <p:cNvSpPr>
-            <a:spLocks noGrp="1"/>
-          </p:cNvSpPr>
-          <p:nvPr>
-            <p:ph type="pic" sz="quarter" idx="14"/>
-          </p:nvPr>
-        </p:nvSpPr>
-        <p:spPr/>
-      </p:sp>
-      <p:sp>
-        <p:nvSpPr>
-          <p:cNvPr id="10" name="Text Placeholder 9">
-            <a:extLst>
-              <a:ext uri="{FF2B5EF4-FFF2-40B4-BE49-F238E27FC236}">
-                <a16:creationId xmlns:a16="http://schemas.microsoft.com/office/drawing/2014/main" id="{5B48E760-E78F-474B-A3C7-9BF28A537A5D}"/>
-              </a:ext>
-            </a:extLst>
-          </p:cNvPr>
-          <p:cNvSpPr>
-            <a:spLocks noGrp="1"/>
-          </p:cNvSpPr>
-          <p:nvPr>
-            <p:ph type="body" sz="quarter" idx="15"/>
-          </p:nvPr>
-        </p:nvSpPr>
-        <p:spPr/>
-        <p:txBody>
-          <a:bodyPr/>
-          <a:lstStyle/>
-          <a:p>
-            <a:endParaRPr lang="en-US"/>
+            <a:r>
+              <a:rPr lang="en-US" dirty="0" smtClean="0"/>
+              <a:t>bindings </a:t>
+            </a:r>
+            <a:r>
+              <a:rPr lang="en-US" dirty="0"/>
+              <a:t>to cross platform </a:t>
+            </a:r>
+            <a:r>
+              <a:rPr lang="en-US" dirty="0" smtClean="0"/>
+              <a:t>libs</a:t>
+            </a:r>
+            <a:endParaRPr lang="ru-RU" dirty="0"/>
           </a:p>
         </p:txBody>
       </p:sp>
     </p:spTree>
     <p:extLst>
       <p:ext uri="{BB962C8B-B14F-4D97-AF65-F5344CB8AC3E}">
-        <p14:creationId xmlns:p14="http://schemas.microsoft.com/office/powerpoint/2010/main" val="3052919976"/>
+        <p14:creationId xmlns:p14="http://schemas.microsoft.com/office/powerpoint/2010/main" val="262443413"/>
       </p:ext>
     </p:extLst>
   </p:cSld>
@@ -16275,13 +16923,7 @@
       </p:grpSpPr>
       <p:sp>
         <p:nvSpPr>
-          <p:cNvPr id="6" name="Title 5">
-            <a:extLst>
-              <a:ext uri="{FF2B5EF4-FFF2-40B4-BE49-F238E27FC236}">
-                <a16:creationId xmlns:a16="http://schemas.microsoft.com/office/drawing/2014/main" id="{039A05CA-F35A-4415-8BD4-701C9CFFC08F}"/>
-              </a:ext>
-            </a:extLst>
-          </p:cNvPr>
+          <p:cNvPr id="3" name="Заголовок 2"/>
           <p:cNvSpPr>
             <a:spLocks noGrp="1"/>
           </p:cNvSpPr>
@@ -16294,39 +16936,26 @@
           <a:bodyPr/>
           <a:lstStyle/>
           <a:p>
-            <a:endParaRPr lang="en-US"/>
-          </a:p>
-        </p:txBody>
-      </p:sp>
-      <p:sp>
-        <p:nvSpPr>
-          <p:cNvPr id="7" name="Content Placeholder 6">
-            <a:extLst>
-              <a:ext uri="{FF2B5EF4-FFF2-40B4-BE49-F238E27FC236}">
-                <a16:creationId xmlns:a16="http://schemas.microsoft.com/office/drawing/2014/main" id="{2006F1CA-F7C7-4285-BC43-6C49520478A5}"/>
-              </a:ext>
-            </a:extLst>
-          </p:cNvPr>
-          <p:cNvSpPr>
-            <a:spLocks noGrp="1"/>
-          </p:cNvSpPr>
-          <p:nvPr>
-            <p:ph sz="quarter" idx="10"/>
-          </p:nvPr>
-        </p:nvSpPr>
-        <p:spPr/>
-        <p:txBody>
-          <a:bodyPr/>
-          <a:lstStyle/>
-          <a:p>
-            <a:endParaRPr lang="en-US"/>
+            <a:r>
+              <a:rPr lang="en-US" dirty="0"/>
+              <a:t>Popular </a:t>
+            </a:r>
+            <a:r>
+              <a:rPr lang="en-US" dirty="0" smtClean="0"/>
+              <a:t>Cross-platform </a:t>
+            </a:r>
+            <a:r>
+              <a:rPr lang="en-US" dirty="0"/>
+              <a:t>GUI libraries</a:t>
+            </a:r>
+            <a:endParaRPr lang="ru-RU" dirty="0"/>
           </a:p>
         </p:txBody>
       </p:sp>
     </p:spTree>
     <p:extLst>
       <p:ext uri="{BB962C8B-B14F-4D97-AF65-F5344CB8AC3E}">
-        <p14:creationId xmlns:p14="http://schemas.microsoft.com/office/powerpoint/2010/main" val="3373798190"/>
+        <p14:creationId xmlns:p14="http://schemas.microsoft.com/office/powerpoint/2010/main" val="3220400109"/>
       </p:ext>
     </p:extLst>
   </p:cSld>
@@ -16355,18 +16984,12 @@
       </p:grpSpPr>
       <p:sp>
         <p:nvSpPr>
-          <p:cNvPr id="7" name="Content Placeholder 6">
-            <a:extLst>
-              <a:ext uri="{FF2B5EF4-FFF2-40B4-BE49-F238E27FC236}">
-                <a16:creationId xmlns:a16="http://schemas.microsoft.com/office/drawing/2014/main" id="{2D494517-F42B-4F0E-807B-62CA0BB9CB1F}"/>
-              </a:ext>
-            </a:extLst>
-          </p:cNvPr>
+          <p:cNvPr id="2" name="Заголовок 1"/>
           <p:cNvSpPr>
             <a:spLocks noGrp="1"/>
           </p:cNvSpPr>
           <p:nvPr>
-            <p:ph sz="quarter" idx="16"/>
+            <p:ph type="title"/>
           </p:nvPr>
         </p:nvSpPr>
         <p:spPr/>
@@ -16374,139 +16997,18 @@
           <a:bodyPr/>
           <a:lstStyle/>
           <a:p>
-            <a:endParaRPr lang="en-US"/>
-          </a:p>
-        </p:txBody>
-      </p:sp>
-      <p:sp>
-        <p:nvSpPr>
-          <p:cNvPr id="5" name="Text Placeholder 4">
-            <a:extLst>
-              <a:ext uri="{FF2B5EF4-FFF2-40B4-BE49-F238E27FC236}">
-                <a16:creationId xmlns:a16="http://schemas.microsoft.com/office/drawing/2014/main" id="{687B50FC-91DE-46B2-ACA5-7FDC429C7340}"/>
-              </a:ext>
-            </a:extLst>
-          </p:cNvPr>
-          <p:cNvSpPr>
-            <a:spLocks noGrp="1"/>
-          </p:cNvSpPr>
-          <p:nvPr>
-            <p:ph type="body" sz="quarter" idx="11"/>
-          </p:nvPr>
-        </p:nvSpPr>
-        <p:spPr/>
-        <p:txBody>
-          <a:bodyPr/>
-          <a:lstStyle/>
-          <a:p>
-            <a:endParaRPr lang="en-US"/>
-          </a:p>
-        </p:txBody>
-      </p:sp>
-      <p:sp>
-        <p:nvSpPr>
-          <p:cNvPr id="4" name="Text Placeholder 3">
-            <a:extLst>
-              <a:ext uri="{FF2B5EF4-FFF2-40B4-BE49-F238E27FC236}">
-                <a16:creationId xmlns:a16="http://schemas.microsoft.com/office/drawing/2014/main" id="{3A5A3691-DAD2-45AC-887B-2C858A41404C}"/>
-              </a:ext>
-            </a:extLst>
-          </p:cNvPr>
-          <p:cNvSpPr>
-            <a:spLocks noGrp="1"/>
-          </p:cNvSpPr>
-          <p:nvPr>
-            <p:ph type="body" sz="quarter" idx="10"/>
-          </p:nvPr>
-        </p:nvSpPr>
-        <p:spPr/>
-        <p:txBody>
-          <a:bodyPr/>
-          <a:lstStyle/>
-          <a:p>
-            <a:endParaRPr lang="en-US"/>
-          </a:p>
-        </p:txBody>
-      </p:sp>
-      <p:sp>
-        <p:nvSpPr>
-          <p:cNvPr id="6" name="Text Placeholder 5">
-            <a:extLst>
-              <a:ext uri="{FF2B5EF4-FFF2-40B4-BE49-F238E27FC236}">
-                <a16:creationId xmlns:a16="http://schemas.microsoft.com/office/drawing/2014/main" id="{2E64EE40-AEA3-4F7C-9425-5E722765A601}"/>
-              </a:ext>
-            </a:extLst>
-          </p:cNvPr>
-          <p:cNvSpPr>
-            <a:spLocks noGrp="1"/>
-          </p:cNvSpPr>
-          <p:nvPr>
-            <p:ph type="body" sz="quarter" idx="12"/>
-          </p:nvPr>
-        </p:nvSpPr>
-        <p:spPr/>
-        <p:txBody>
-          <a:bodyPr/>
-          <a:lstStyle/>
-          <a:p>
-            <a:endParaRPr lang="en-US"/>
-          </a:p>
-        </p:txBody>
-      </p:sp>
-      <p:sp>
-        <p:nvSpPr>
-          <p:cNvPr id="8" name="Content Placeholder 7">
-            <a:extLst>
-              <a:ext uri="{FF2B5EF4-FFF2-40B4-BE49-F238E27FC236}">
-                <a16:creationId xmlns:a16="http://schemas.microsoft.com/office/drawing/2014/main" id="{4EC9AECC-ADC5-49E8-A16E-E43A56BEC3F3}"/>
-              </a:ext>
-            </a:extLst>
-          </p:cNvPr>
-          <p:cNvSpPr>
-            <a:spLocks noGrp="1"/>
-          </p:cNvSpPr>
-          <p:nvPr>
-            <p:ph sz="quarter" idx="17"/>
-          </p:nvPr>
-        </p:nvSpPr>
-        <p:spPr/>
-        <p:txBody>
-          <a:bodyPr/>
-          <a:lstStyle/>
-          <a:p>
-            <a:endParaRPr lang="en-US"/>
-          </a:p>
-        </p:txBody>
-      </p:sp>
-      <p:sp>
-        <p:nvSpPr>
-          <p:cNvPr id="9" name="Content Placeholder 8">
-            <a:extLst>
-              <a:ext uri="{FF2B5EF4-FFF2-40B4-BE49-F238E27FC236}">
-                <a16:creationId xmlns:a16="http://schemas.microsoft.com/office/drawing/2014/main" id="{7BCD89D7-6514-4C0A-AF98-D064C901113F}"/>
-              </a:ext>
-            </a:extLst>
-          </p:cNvPr>
-          <p:cNvSpPr>
-            <a:spLocks noGrp="1"/>
-          </p:cNvSpPr>
-          <p:nvPr>
-            <p:ph sz="quarter" idx="18"/>
-          </p:nvPr>
-        </p:nvSpPr>
-        <p:spPr/>
-        <p:txBody>
-          <a:bodyPr/>
-          <a:lstStyle/>
-          <a:p>
-            <a:endParaRPr lang="en-US"/>
+            <a:r>
+              <a:rPr lang="en-US" dirty="0" smtClean="0"/>
+              <a:t>GTK+</a:t>
+            </a:r>
+            <a:endParaRPr lang="ru-RU" dirty="0"/>
           </a:p>
         </p:txBody>
       </p:sp>
     </p:spTree>
     <p:extLst>
       <p:ext uri="{BB962C8B-B14F-4D97-AF65-F5344CB8AC3E}">
-        <p14:creationId xmlns:p14="http://schemas.microsoft.com/office/powerpoint/2010/main" val="3907029327"/>
+        <p14:creationId xmlns:p14="http://schemas.microsoft.com/office/powerpoint/2010/main" val="2695960159"/>
       </p:ext>
     </p:extLst>
   </p:cSld>
@@ -16535,18 +17037,12 @@
       </p:grpSpPr>
       <p:sp>
         <p:nvSpPr>
-          <p:cNvPr id="2" name="Content Placeholder 1">
-            <a:extLst>
-              <a:ext uri="{FF2B5EF4-FFF2-40B4-BE49-F238E27FC236}">
-                <a16:creationId xmlns:a16="http://schemas.microsoft.com/office/drawing/2014/main" id="{09B24864-1C86-4192-AAED-42A2F180A8B0}"/>
-              </a:ext>
-            </a:extLst>
-          </p:cNvPr>
+          <p:cNvPr id="2" name="Заголовок 1"/>
           <p:cNvSpPr>
             <a:spLocks noGrp="1"/>
           </p:cNvSpPr>
           <p:nvPr>
-            <p:ph sz="quarter" idx="16"/>
+            <p:ph type="title"/>
           </p:nvPr>
         </p:nvSpPr>
         <p:spPr/>
@@ -16554,139 +17050,18 @@
           <a:bodyPr/>
           <a:lstStyle/>
           <a:p>
-            <a:endParaRPr lang="en-US"/>
-          </a:p>
-        </p:txBody>
-      </p:sp>
-      <p:sp>
-        <p:nvSpPr>
-          <p:cNvPr id="3" name="Text Placeholder 2">
-            <a:extLst>
-              <a:ext uri="{FF2B5EF4-FFF2-40B4-BE49-F238E27FC236}">
-                <a16:creationId xmlns:a16="http://schemas.microsoft.com/office/drawing/2014/main" id="{A2A3992F-6894-4053-B066-53BB02863B74}"/>
-              </a:ext>
-            </a:extLst>
-          </p:cNvPr>
-          <p:cNvSpPr>
-            <a:spLocks noGrp="1"/>
-          </p:cNvSpPr>
-          <p:nvPr>
-            <p:ph type="body" sz="quarter" idx="11"/>
-          </p:nvPr>
-        </p:nvSpPr>
-        <p:spPr/>
-        <p:txBody>
-          <a:bodyPr/>
-          <a:lstStyle/>
-          <a:p>
-            <a:endParaRPr lang="en-US"/>
-          </a:p>
-        </p:txBody>
-      </p:sp>
-      <p:sp>
-        <p:nvSpPr>
-          <p:cNvPr id="4" name="Text Placeholder 3">
-            <a:extLst>
-              <a:ext uri="{FF2B5EF4-FFF2-40B4-BE49-F238E27FC236}">
-                <a16:creationId xmlns:a16="http://schemas.microsoft.com/office/drawing/2014/main" id="{BB602739-D122-4F88-A78B-0708996348E0}"/>
-              </a:ext>
-            </a:extLst>
-          </p:cNvPr>
-          <p:cNvSpPr>
-            <a:spLocks noGrp="1"/>
-          </p:cNvSpPr>
-          <p:nvPr>
-            <p:ph type="body" sz="quarter" idx="10"/>
-          </p:nvPr>
-        </p:nvSpPr>
-        <p:spPr/>
-        <p:txBody>
-          <a:bodyPr/>
-          <a:lstStyle/>
-          <a:p>
-            <a:endParaRPr lang="en-US"/>
-          </a:p>
-        </p:txBody>
-      </p:sp>
-      <p:sp>
-        <p:nvSpPr>
-          <p:cNvPr id="5" name="Text Placeholder 4">
-            <a:extLst>
-              <a:ext uri="{FF2B5EF4-FFF2-40B4-BE49-F238E27FC236}">
-                <a16:creationId xmlns:a16="http://schemas.microsoft.com/office/drawing/2014/main" id="{09AD7DCF-E630-4CC4-B47C-D1AD17C62EA8}"/>
-              </a:ext>
-            </a:extLst>
-          </p:cNvPr>
-          <p:cNvSpPr>
-            <a:spLocks noGrp="1"/>
-          </p:cNvSpPr>
-          <p:nvPr>
-            <p:ph type="body" sz="quarter" idx="12"/>
-          </p:nvPr>
-        </p:nvSpPr>
-        <p:spPr/>
-        <p:txBody>
-          <a:bodyPr/>
-          <a:lstStyle/>
-          <a:p>
-            <a:endParaRPr lang="en-US"/>
-          </a:p>
-        </p:txBody>
-      </p:sp>
-      <p:sp>
-        <p:nvSpPr>
-          <p:cNvPr id="6" name="Content Placeholder 5">
-            <a:extLst>
-              <a:ext uri="{FF2B5EF4-FFF2-40B4-BE49-F238E27FC236}">
-                <a16:creationId xmlns:a16="http://schemas.microsoft.com/office/drawing/2014/main" id="{E73D19FB-5C47-4595-9199-A398F4D87696}"/>
-              </a:ext>
-            </a:extLst>
-          </p:cNvPr>
-          <p:cNvSpPr>
-            <a:spLocks noGrp="1"/>
-          </p:cNvSpPr>
-          <p:nvPr>
-            <p:ph sz="quarter" idx="17"/>
-          </p:nvPr>
-        </p:nvSpPr>
-        <p:spPr/>
-        <p:txBody>
-          <a:bodyPr/>
-          <a:lstStyle/>
-          <a:p>
-            <a:endParaRPr lang="en-US"/>
-          </a:p>
-        </p:txBody>
-      </p:sp>
-      <p:sp>
-        <p:nvSpPr>
-          <p:cNvPr id="7" name="Content Placeholder 6">
-            <a:extLst>
-              <a:ext uri="{FF2B5EF4-FFF2-40B4-BE49-F238E27FC236}">
-                <a16:creationId xmlns:a16="http://schemas.microsoft.com/office/drawing/2014/main" id="{A2E3D1A6-84B8-4DDF-993C-A645A3B3A239}"/>
-              </a:ext>
-            </a:extLst>
-          </p:cNvPr>
-          <p:cNvSpPr>
-            <a:spLocks noGrp="1"/>
-          </p:cNvSpPr>
-          <p:nvPr>
-            <p:ph sz="quarter" idx="18"/>
-          </p:nvPr>
-        </p:nvSpPr>
-        <p:spPr/>
-        <p:txBody>
-          <a:bodyPr/>
-          <a:lstStyle/>
-          <a:p>
-            <a:endParaRPr lang="en-US"/>
+            <a:r>
+              <a:rPr lang="en-US" dirty="0" smtClean="0"/>
+              <a:t>GTK#</a:t>
+            </a:r>
+            <a:endParaRPr lang="ru-RU" dirty="0"/>
           </a:p>
         </p:txBody>
       </p:sp>
     </p:spTree>
     <p:extLst>
       <p:ext uri="{BB962C8B-B14F-4D97-AF65-F5344CB8AC3E}">
-        <p14:creationId xmlns:p14="http://schemas.microsoft.com/office/powerpoint/2010/main" val="3192811625"/>
+        <p14:creationId xmlns:p14="http://schemas.microsoft.com/office/powerpoint/2010/main" val="389671003"/>
       </p:ext>
     </p:extLst>
   </p:cSld>
@@ -16715,18 +17090,12 @@
       </p:grpSpPr>
       <p:sp>
         <p:nvSpPr>
-          <p:cNvPr id="8" name="Text Placeholder 7">
-            <a:extLst>
-              <a:ext uri="{FF2B5EF4-FFF2-40B4-BE49-F238E27FC236}">
-                <a16:creationId xmlns:a16="http://schemas.microsoft.com/office/drawing/2014/main" id="{067DBE8A-EB42-4335-A2A5-3ACDF58A0ED9}"/>
-              </a:ext>
-            </a:extLst>
-          </p:cNvPr>
+          <p:cNvPr id="2" name="Заголовок 1"/>
           <p:cNvSpPr>
             <a:spLocks noGrp="1"/>
           </p:cNvSpPr>
           <p:nvPr>
-            <p:ph type="body" sz="quarter" idx="10"/>
+            <p:ph type="title"/>
           </p:nvPr>
         </p:nvSpPr>
         <p:spPr/>
@@ -16734,14 +17103,26 @@
           <a:bodyPr/>
           <a:lstStyle/>
           <a:p>
-            <a:endParaRPr lang="en-US"/>
+            <a:r>
+              <a:rPr lang="en-US" dirty="0" err="1" smtClean="0"/>
+              <a:t>Qt</a:t>
+            </a:r>
+            <a:r>
+              <a:rPr lang="en-US" dirty="0" smtClean="0"/>
+              <a:t>/</a:t>
+            </a:r>
+            <a:r>
+              <a:rPr lang="en-US" dirty="0" err="1" smtClean="0"/>
+              <a:t>Qml</a:t>
+            </a:r>
+            <a:endParaRPr lang="ru-RU" dirty="0"/>
           </a:p>
         </p:txBody>
       </p:sp>
     </p:spTree>
     <p:extLst>
       <p:ext uri="{BB962C8B-B14F-4D97-AF65-F5344CB8AC3E}">
-        <p14:creationId xmlns:p14="http://schemas.microsoft.com/office/powerpoint/2010/main" val="817044571"/>
+        <p14:creationId xmlns:p14="http://schemas.microsoft.com/office/powerpoint/2010/main" val="3287680912"/>
       </p:ext>
     </p:extLst>
   </p:cSld>

</xml_diff>

<commit_message>
Update presentation - native libs slide
</commit_message>
<xml_diff>
--- a/presentation.pptx
+++ b/presentation.pptx
@@ -4036,7 +4036,7 @@
           <a:p>
             <a:fld id="{3FDC14FC-A894-4869-A797-1EC82735D106}" type="datetimeFigureOut">
               <a:rPr lang="en-US" smtClean="0"/>
-              <a:t>10/19/2019</a:t>
+              <a:t>10/20/2019</a:t>
             </a:fld>
             <a:endParaRPr lang="en-US"/>
           </a:p>
@@ -4201,7 +4201,7 @@
           <a:p>
             <a:fld id="{B4F99C05-63F9-4248-8E20-3ACD9DF9DE7F}" type="datetimeFigureOut">
               <a:rPr lang="en-US" smtClean="0"/>
-              <a:t>10/19/2019</a:t>
+              <a:t>10/20/2019</a:t>
             </a:fld>
             <a:endParaRPr lang="en-US"/>
           </a:p>
@@ -11357,7 +11357,7 @@
           </a:ln>
           <a:extLst>
             <a:ext uri="{C572A759-6A51-4108-AA02-DFA0A04FC94B}">
-              <ma14:wrappingTextBoxFlag xmlns="" xmlns:ma14="http://schemas.microsoft.com/office/mac/drawingml/2011/main" val="1"/>
+              <ma14:wrappingTextBoxFlag xmlns:ma14="http://schemas.microsoft.com/office/mac/drawingml/2011/main" xmlns="" val="1"/>
             </a:ext>
           </a:extLst>
         </p:spPr>
@@ -20983,65 +20983,354 @@
           </a:p>
         </p:txBody>
       </p:sp>
-      <p:pic>
-        <p:nvPicPr>
-          <p:cNvPr id="4" name="Рисунок 3"/>
-          <p:cNvPicPr>
-            <a:picLocks noChangeAspect="1"/>
-          </p:cNvPicPr>
-          <p:nvPr/>
-        </p:nvPicPr>
-        <p:blipFill>
-          <a:blip r:embed="rId2">
-            <a:extLst>
-              <a:ext uri="{28A0092B-C50C-407E-A947-70E740481C1C}">
-                <a14:useLocalDpi xmlns:a14="http://schemas.microsoft.com/office/drawing/2010/main" val="0"/>
-              </a:ext>
-            </a:extLst>
-          </a:blip>
-          <a:stretch>
-            <a:fillRect/>
-          </a:stretch>
-        </p:blipFill>
-        <p:spPr>
-          <a:xfrm>
-            <a:off x="488554" y="826770"/>
-            <a:ext cx="1905000" cy="1905000"/>
-          </a:xfrm>
-          <a:prstGeom prst="rect">
-            <a:avLst/>
-          </a:prstGeom>
-        </p:spPr>
-      </p:pic>
-      <p:pic>
-        <p:nvPicPr>
-          <p:cNvPr id="7" name="Рисунок 6"/>
-          <p:cNvPicPr>
-            <a:picLocks noChangeAspect="1"/>
-          </p:cNvPicPr>
-          <p:nvPr/>
-        </p:nvPicPr>
-        <p:blipFill rotWithShape="1">
-          <a:blip r:embed="rId3">
-            <a:extLst>
-              <a:ext uri="{28A0092B-C50C-407E-A947-70E740481C1C}">
-                <a14:useLocalDpi xmlns:a14="http://schemas.microsoft.com/office/drawing/2010/main" val="0"/>
-              </a:ext>
-            </a:extLst>
-          </a:blip>
-          <a:srcRect l="34833" t="29001" r="34500" b="18714"/>
-          <a:stretch/>
-        </p:blipFill>
-        <p:spPr>
-          <a:xfrm>
-            <a:off x="669685" y="2731770"/>
-            <a:ext cx="1723869" cy="1714500"/>
-          </a:xfrm>
-          <a:prstGeom prst="rect">
-            <a:avLst/>
-          </a:prstGeom>
-        </p:spPr>
-      </p:pic>
+      <p:graphicFrame>
+        <p:nvGraphicFramePr>
+          <p:cNvPr id="2" name="Таблица 1"/>
+          <p:cNvGraphicFramePr>
+            <a:graphicFrameLocks noGrp="1"/>
+          </p:cNvGraphicFramePr>
+          <p:nvPr>
+            <p:extLst>
+              <p:ext uri="{D42A27DB-BD31-4B8C-83A1-F6EECF244321}">
+                <p14:modId xmlns:p14="http://schemas.microsoft.com/office/powerpoint/2010/main" val="1072230201"/>
+              </p:ext>
+            </p:extLst>
+          </p:nvPr>
+        </p:nvGraphicFramePr>
+        <p:xfrm>
+          <a:off x="298133" y="839881"/>
+          <a:ext cx="8488680" cy="3730184"/>
+        </p:xfrm>
+        <a:graphic>
+          <a:graphicData uri="http://schemas.openxmlformats.org/drawingml/2006/table">
+            <a:tbl>
+              <a:tblPr firstRow="1" bandRow="1">
+                <a:tableStyleId>{5C22544A-7EE6-4342-B048-85BDC9FD1C3A}</a:tableStyleId>
+              </a:tblPr>
+              <a:tblGrid>
+                <a:gridCol w="1805940">
+                  <a:extLst>
+                    <a:ext uri="{9D8B030D-6E8A-4147-A177-3AD203B41FA5}">
+                      <a16:colId xmlns:a16="http://schemas.microsoft.com/office/drawing/2014/main" val="413003422"/>
+                    </a:ext>
+                  </a:extLst>
+                </a:gridCol>
+                <a:gridCol w="1584960">
+                  <a:extLst>
+                    <a:ext uri="{9D8B030D-6E8A-4147-A177-3AD203B41FA5}">
+                      <a16:colId xmlns:a16="http://schemas.microsoft.com/office/drawing/2014/main" val="3957436638"/>
+                    </a:ext>
+                  </a:extLst>
+                </a:gridCol>
+                <a:gridCol w="2975610">
+                  <a:extLst>
+                    <a:ext uri="{9D8B030D-6E8A-4147-A177-3AD203B41FA5}">
+                      <a16:colId xmlns:a16="http://schemas.microsoft.com/office/drawing/2014/main" val="3600493432"/>
+                    </a:ext>
+                  </a:extLst>
+                </a:gridCol>
+                <a:gridCol w="2122170">
+                  <a:extLst>
+                    <a:ext uri="{9D8B030D-6E8A-4147-A177-3AD203B41FA5}">
+                      <a16:colId xmlns:a16="http://schemas.microsoft.com/office/drawing/2014/main" val="1890482617"/>
+                    </a:ext>
+                  </a:extLst>
+                </a:gridCol>
+              </a:tblGrid>
+              <a:tr h="345951">
+                <a:tc gridSpan="2">
+                  <a:txBody>
+                    <a:bodyPr/>
+                    <a:lstStyle/>
+                    <a:p>
+                      <a:pPr algn="ctr"/>
+                      <a:r>
+                        <a:rPr lang="en-US" dirty="0" smtClean="0"/>
+                        <a:t>Library</a:t>
+                      </a:r>
+                      <a:endParaRPr lang="ru-RU" dirty="0"/>
+                    </a:p>
+                  </a:txBody>
+                  <a:tcPr anchor="ctr"/>
+                </a:tc>
+                <a:tc hMerge="1">
+                  <a:txBody>
+                    <a:bodyPr/>
+                    <a:lstStyle/>
+                    <a:p>
+                      <a:endParaRPr lang="ru-RU" dirty="0"/>
+                    </a:p>
+                  </a:txBody>
+                  <a:tcPr/>
+                </a:tc>
+                <a:tc>
+                  <a:txBody>
+                    <a:bodyPr/>
+                    <a:lstStyle/>
+                    <a:p>
+                      <a:pPr algn="ctr"/>
+                      <a:r>
+                        <a:rPr lang="en-US" dirty="0" smtClean="0"/>
+                        <a:t>Render(s)</a:t>
+                      </a:r>
+                      <a:endParaRPr lang="ru-RU" dirty="0"/>
+                    </a:p>
+                  </a:txBody>
+                  <a:tcPr anchor="ctr"/>
+                </a:tc>
+                <a:tc>
+                  <a:txBody>
+                    <a:bodyPr/>
+                    <a:lstStyle/>
+                    <a:p>
+                      <a:pPr algn="ctr"/>
+                      <a:r>
+                        <a:rPr lang="en-US" dirty="0" smtClean="0"/>
+                        <a:t>Target Frameworks</a:t>
+                      </a:r>
+                      <a:endParaRPr lang="ru-RU" dirty="0"/>
+                    </a:p>
+                  </a:txBody>
+                  <a:tcPr anchor="ctr"/>
+                </a:tc>
+                <a:extLst>
+                  <a:ext uri="{0D108BD9-81ED-4DB2-BD59-A6C34878D82A}">
+                    <a16:rowId xmlns:a16="http://schemas.microsoft.com/office/drawing/2014/main" val="2980316052"/>
+                  </a:ext>
+                </a:extLst>
+              </a:tr>
+              <a:tr h="1667099">
+                <a:tc>
+                  <a:txBody>
+                    <a:bodyPr/>
+                    <a:lstStyle/>
+                    <a:p>
+                      <a:endParaRPr lang="ru-RU" dirty="0"/>
+                    </a:p>
+                  </a:txBody>
+                  <a:tcPr>
+                    <a:blipFill>
+                      <a:blip r:embed="rId2"/>
+                      <a:stretch>
+                        <a:fillRect/>
+                      </a:stretch>
+                    </a:blipFill>
+                  </a:tcPr>
+                </a:tc>
+                <a:tc>
+                  <a:txBody>
+                    <a:bodyPr/>
+                    <a:lstStyle/>
+                    <a:p>
+                      <a:pPr algn="ctr"/>
+                      <a:r>
+                        <a:rPr lang="en-US" dirty="0" smtClean="0"/>
+                        <a:t>Avalonia UI</a:t>
+                      </a:r>
+                      <a:endParaRPr lang="ru-RU" dirty="0"/>
+                    </a:p>
+                  </a:txBody>
+                  <a:tcPr anchor="ctr"/>
+                </a:tc>
+                <a:tc>
+                  <a:txBody>
+                    <a:bodyPr/>
+                    <a:lstStyle/>
+                    <a:p>
+                      <a:pPr algn="ctr"/>
+                      <a:r>
+                        <a:rPr lang="en-US" dirty="0" smtClean="0"/>
+                        <a:t>Own</a:t>
+                      </a:r>
+                    </a:p>
+                    <a:p>
+                      <a:pPr algn="ctr"/>
+                      <a:r>
+                        <a:rPr lang="en-US" dirty="0" smtClean="0"/>
+                        <a:t>(Direct2D, </a:t>
+                      </a:r>
+                      <a:r>
+                        <a:rPr lang="en-US" dirty="0" err="1" smtClean="0"/>
+                        <a:t>Skia</a:t>
+                      </a:r>
+                      <a:r>
+                        <a:rPr lang="en-US" dirty="0" smtClean="0"/>
+                        <a:t>, Cairo)</a:t>
+                      </a:r>
+                      <a:endParaRPr lang="ru-RU" dirty="0"/>
+                    </a:p>
+                  </a:txBody>
+                  <a:tcPr anchor="ctr"/>
+                </a:tc>
+                <a:tc>
+                  <a:txBody>
+                    <a:bodyPr/>
+                    <a:lstStyle/>
+                    <a:p>
+                      <a:pPr algn="ctr"/>
+                      <a:r>
+                        <a:rPr lang="en-US" dirty="0" err="1" smtClean="0"/>
+                        <a:t>.Net</a:t>
+                      </a:r>
+                      <a:r>
+                        <a:rPr lang="en-US" dirty="0" smtClean="0"/>
+                        <a:t> Framework, </a:t>
+                      </a:r>
+                      <a:r>
+                        <a:rPr lang="en-US" dirty="0" err="1" smtClean="0"/>
+                        <a:t>.Net</a:t>
+                      </a:r>
+                      <a:r>
+                        <a:rPr lang="en-US" dirty="0" smtClean="0"/>
+                        <a:t> Core</a:t>
+                      </a:r>
+                      <a:endParaRPr lang="ru-RU" dirty="0"/>
+                    </a:p>
+                  </a:txBody>
+                  <a:tcPr anchor="ctr"/>
+                </a:tc>
+                <a:extLst>
+                  <a:ext uri="{0D108BD9-81ED-4DB2-BD59-A6C34878D82A}">
+                    <a16:rowId xmlns:a16="http://schemas.microsoft.com/office/drawing/2014/main" val="1057982108"/>
+                  </a:ext>
+                </a:extLst>
+              </a:tr>
+              <a:tr h="1697325">
+                <a:tc>
+                  <a:txBody>
+                    <a:bodyPr/>
+                    <a:lstStyle/>
+                    <a:p>
+                      <a:endParaRPr lang="ru-RU" dirty="0"/>
+                    </a:p>
+                  </a:txBody>
+                  <a:tcPr>
+                    <a:blipFill>
+                      <a:blip r:embed="rId3"/>
+                      <a:stretch>
+                        <a:fillRect/>
+                      </a:stretch>
+                    </a:blipFill>
+                  </a:tcPr>
+                </a:tc>
+                <a:tc>
+                  <a:txBody>
+                    <a:bodyPr/>
+                    <a:lstStyle/>
+                    <a:p>
+                      <a:pPr algn="ctr"/>
+                      <a:r>
+                        <a:rPr lang="en-US" dirty="0" err="1" smtClean="0"/>
+                        <a:t>Eto.Forms</a:t>
+                      </a:r>
+                      <a:endParaRPr lang="ru-RU" dirty="0"/>
+                    </a:p>
+                  </a:txBody>
+                  <a:tcPr anchor="ctr"/>
+                </a:tc>
+                <a:tc>
+                  <a:txBody>
+                    <a:bodyPr/>
+                    <a:lstStyle/>
+                    <a:p>
+                      <a:pPr algn="ctr"/>
+                      <a:r>
+                        <a:rPr lang="en-US" dirty="0" smtClean="0"/>
+                        <a:t>WPF, </a:t>
+                      </a:r>
+                      <a:r>
+                        <a:rPr lang="en-US" dirty="0" err="1" smtClean="0"/>
+                        <a:t>WinForms</a:t>
+                      </a:r>
+                      <a:r>
+                        <a:rPr lang="en-US" dirty="0" smtClean="0"/>
+                        <a:t>, GTK</a:t>
+                      </a:r>
+                      <a:endParaRPr lang="ru-RU" dirty="0"/>
+                    </a:p>
+                  </a:txBody>
+                  <a:tcPr anchor="ctr"/>
+                </a:tc>
+                <a:tc>
+                  <a:txBody>
+                    <a:bodyPr/>
+                    <a:lstStyle/>
+                    <a:p>
+                      <a:pPr marL="0" marR="0" lvl="0" indent="0" algn="ctr" defTabSz="914400" rtl="0" eaLnBrk="1" fontAlgn="auto" latinLnBrk="0" hangingPunct="1">
+                        <a:lnSpc>
+                          <a:spcPct val="100000"/>
+                        </a:lnSpc>
+                        <a:spcBef>
+                          <a:spcPts val="0"/>
+                        </a:spcBef>
+                        <a:spcAft>
+                          <a:spcPts val="0"/>
+                        </a:spcAft>
+                        <a:buClrTx/>
+                        <a:buSzTx/>
+                        <a:buFontTx/>
+                        <a:buNone/>
+                        <a:tabLst/>
+                        <a:defRPr/>
+                      </a:pPr>
+                      <a:r>
+                        <a:rPr lang="en-US" dirty="0" err="1" smtClean="0"/>
+                        <a:t>.Net</a:t>
+                      </a:r>
+                      <a:r>
+                        <a:rPr lang="en-US" dirty="0" smtClean="0"/>
+                        <a:t> Framework, </a:t>
+                      </a:r>
+                      <a:r>
+                        <a:rPr lang="en-US" dirty="0" err="1" smtClean="0"/>
+                        <a:t>.Net</a:t>
+                      </a:r>
+                      <a:r>
+                        <a:rPr lang="en-US" dirty="0" smtClean="0"/>
+                        <a:t> Core,</a:t>
+                      </a:r>
+                      <a:r>
+                        <a:rPr lang="en-US" baseline="0" dirty="0" smtClean="0"/>
+                        <a:t> </a:t>
+                      </a:r>
+                    </a:p>
+                    <a:p>
+                      <a:pPr marL="0" marR="0" lvl="0" indent="0" algn="ctr" defTabSz="914400" rtl="0" eaLnBrk="1" fontAlgn="auto" latinLnBrk="0" hangingPunct="1">
+                        <a:lnSpc>
+                          <a:spcPct val="100000"/>
+                        </a:lnSpc>
+                        <a:spcBef>
+                          <a:spcPts val="0"/>
+                        </a:spcBef>
+                        <a:spcAft>
+                          <a:spcPts val="0"/>
+                        </a:spcAft>
+                        <a:buClrTx/>
+                        <a:buSzTx/>
+                        <a:buFontTx/>
+                        <a:buNone/>
+                        <a:tabLst/>
+                        <a:defRPr/>
+                      </a:pPr>
+                      <a:r>
+                        <a:rPr lang="en-US" baseline="0" dirty="0" smtClean="0"/>
+                        <a:t>Mono</a:t>
+                      </a:r>
+                      <a:endParaRPr lang="ru-RU" dirty="0" smtClean="0"/>
+                    </a:p>
+                  </a:txBody>
+                  <a:tcPr anchor="ctr"/>
+                </a:tc>
+                <a:extLst>
+                  <a:ext uri="{0D108BD9-81ED-4DB2-BD59-A6C34878D82A}">
+                    <a16:rowId xmlns:a16="http://schemas.microsoft.com/office/drawing/2014/main" val="4267875977"/>
+                  </a:ext>
+                </a:extLst>
+              </a:tr>
+            </a:tbl>
+          </a:graphicData>
+        </a:graphic>
+      </p:graphicFrame>
     </p:spTree>
     <p:extLst>
       <p:ext uri="{BB962C8B-B14F-4D97-AF65-F5344CB8AC3E}">

</xml_diff>